<commit_message>
Entregables, presentación y video
</commit_message>
<xml_diff>
--- a/00 - Mentoria - deteccion de fraude en pagos de tarjeta de credito/Presentación 2 Grupo 1.pptx
+++ b/00 - Mentoria - deteccion de fraude en pagos de tarjeta de credito/Presentación 2 Grupo 1.pptx
@@ -24,28 +24,23 @@
     <p:sldId id="269" r:id="rId19"/>
     <p:sldId id="270" r:id="rId20"/>
     <p:sldId id="271" r:id="rId21"/>
-    <p:sldId id="272" r:id="rId22"/>
-    <p:sldId id="273" r:id="rId23"/>
-    <p:sldId id="274" r:id="rId24"/>
-    <p:sldId id="275" r:id="rId25"/>
-    <p:sldId id="276" r:id="rId26"/>
   </p:sldIdLst>
   <p:sldSz cy="5143500" cx="9144000"/>
   <p:notesSz cx="6858000" cy="9144000"/>
   <p:embeddedFontLst>
     <p:embeddedFont>
       <p:font typeface="Roboto"/>
-      <p:regular r:id="rId27"/>
-      <p:bold r:id="rId28"/>
-      <p:italic r:id="rId29"/>
-      <p:boldItalic r:id="rId30"/>
+      <p:regular r:id="rId22"/>
+      <p:bold r:id="rId23"/>
+      <p:italic r:id="rId24"/>
+      <p:boldItalic r:id="rId25"/>
     </p:embeddedFont>
     <p:embeddedFont>
       <p:font typeface="EB Garamond"/>
-      <p:regular r:id="rId31"/>
-      <p:bold r:id="rId32"/>
-      <p:italic r:id="rId33"/>
-      <p:boldItalic r:id="rId34"/>
+      <p:regular r:id="rId26"/>
+      <p:bold r:id="rId27"/>
+      <p:italic r:id="rId28"/>
+      <p:boldItalic r:id="rId29"/>
     </p:embeddedFont>
   </p:embeddedFontLst>
   <p:defaultTextStyle>
@@ -939,7 +934,7 @@
       </p:grpSpPr>
       <p:sp>
         <p:nvSpPr>
-          <p:cNvPr id="138" name="Google Shape;138;g13efdabb86f_2_22:notes"/>
+          <p:cNvPr id="138" name="Google Shape;138;g13efdabb86f_2_27:notes"/>
           <p:cNvSpPr/>
           <p:nvPr>
             <p:ph idx="2" type="sldImg"/>
@@ -974,7 +969,7 @@
       </p:sp>
       <p:sp>
         <p:nvSpPr>
-          <p:cNvPr id="139" name="Google Shape;139;g13efdabb86f_2_22:notes"/>
+          <p:cNvPr id="139" name="Google Shape;139;g13efdabb86f_2_27:notes"/>
           <p:cNvSpPr txBox="1"/>
           <p:nvPr>
             <p:ph idx="1" type="body"/>
@@ -1024,7 +1019,7 @@
   <p:cSld>
     <p:spTree>
       <p:nvGrpSpPr>
-        <p:cNvPr id="142" name="Shape 142"/>
+        <p:cNvPr id="146" name="Shape 146"/>
         <p:cNvGrpSpPr/>
         <p:nvPr/>
       </p:nvGrpSpPr>
@@ -1038,7 +1033,7 @@
       </p:grpSpPr>
       <p:sp>
         <p:nvSpPr>
-          <p:cNvPr id="143" name="Google Shape;143;g13efdabb86f_2_27:notes"/>
+          <p:cNvPr id="147" name="Google Shape;147;g13efdabb86f_2_32:notes"/>
           <p:cNvSpPr/>
           <p:nvPr>
             <p:ph idx="2" type="sldImg"/>
@@ -1073,7 +1068,7 @@
       </p:sp>
       <p:sp>
         <p:nvSpPr>
-          <p:cNvPr id="144" name="Google Shape;144;g13efdabb86f_2_27:notes"/>
+          <p:cNvPr id="148" name="Google Shape;148;g13efdabb86f_2_32:notes"/>
           <p:cNvSpPr txBox="1"/>
           <p:nvPr>
             <p:ph idx="1" type="body"/>
@@ -1123,7 +1118,7 @@
   <p:cSld>
     <p:spTree>
       <p:nvGrpSpPr>
-        <p:cNvPr id="151" name="Shape 151"/>
+        <p:cNvPr id="155" name="Shape 155"/>
         <p:cNvGrpSpPr/>
         <p:nvPr/>
       </p:nvGrpSpPr>
@@ -1137,7 +1132,7 @@
       </p:grpSpPr>
       <p:sp>
         <p:nvSpPr>
-          <p:cNvPr id="152" name="Google Shape;152;g13efdabb86f_2_32:notes"/>
+          <p:cNvPr id="156" name="Google Shape;156;g13efdabb86f_2_41:notes"/>
           <p:cNvSpPr/>
           <p:nvPr>
             <p:ph idx="2" type="sldImg"/>
@@ -1172,7 +1167,7 @@
       </p:sp>
       <p:sp>
         <p:nvSpPr>
-          <p:cNvPr id="153" name="Google Shape;153;g13efdabb86f_2_32:notes"/>
+          <p:cNvPr id="157" name="Google Shape;157;g13efdabb86f_2_41:notes"/>
           <p:cNvSpPr txBox="1"/>
           <p:nvPr>
             <p:ph idx="1" type="body"/>
@@ -1222,7 +1217,7 @@
   <p:cSld>
     <p:spTree>
       <p:nvGrpSpPr>
-        <p:cNvPr id="160" name="Shape 160"/>
+        <p:cNvPr id="164" name="Shape 164"/>
         <p:cNvGrpSpPr/>
         <p:nvPr/>
       </p:nvGrpSpPr>
@@ -1236,7 +1231,7 @@
       </p:grpSpPr>
       <p:sp>
         <p:nvSpPr>
-          <p:cNvPr id="161" name="Google Shape;161;g13efdabb86f_2_41:notes"/>
+          <p:cNvPr id="165" name="Google Shape;165;g13efdabb86f_2_46:notes"/>
           <p:cNvSpPr/>
           <p:nvPr>
             <p:ph idx="2" type="sldImg"/>
@@ -1271,7 +1266,7 @@
       </p:sp>
       <p:sp>
         <p:nvSpPr>
-          <p:cNvPr id="162" name="Google Shape;162;g13efdabb86f_2_41:notes"/>
+          <p:cNvPr id="166" name="Google Shape;166;g13efdabb86f_2_46:notes"/>
           <p:cNvSpPr txBox="1"/>
           <p:nvPr>
             <p:ph idx="1" type="body"/>
@@ -1321,7 +1316,7 @@
   <p:cSld>
     <p:spTree>
       <p:nvGrpSpPr>
-        <p:cNvPr id="169" name="Shape 169"/>
+        <p:cNvPr id="173" name="Shape 173"/>
         <p:cNvGrpSpPr/>
         <p:nvPr/>
       </p:nvGrpSpPr>
@@ -1335,7 +1330,7 @@
       </p:grpSpPr>
       <p:sp>
         <p:nvSpPr>
-          <p:cNvPr id="170" name="Google Shape;170;g13efdabb86f_2_46:notes"/>
+          <p:cNvPr id="174" name="Google Shape;174;gfefa4b260b_0_37:notes"/>
           <p:cNvSpPr/>
           <p:nvPr>
             <p:ph idx="2" type="sldImg"/>
@@ -1370,7 +1365,7 @@
       </p:sp>
       <p:sp>
         <p:nvSpPr>
-          <p:cNvPr id="171" name="Google Shape;171;g13efdabb86f_2_46:notes"/>
+          <p:cNvPr id="175" name="Google Shape;175;gfefa4b260b_0_37:notes"/>
           <p:cNvSpPr txBox="1"/>
           <p:nvPr>
             <p:ph idx="1" type="body"/>
@@ -1390,6 +1385,21 @@
             <a:noAutofit/>
           </a:bodyPr>
           <a:lstStyle/>
+          <a:p>
+            <a:pPr indent="0" lvl="0" marL="0" rtl="0" algn="l">
+              <a:spcBef>
+                <a:spcPts val="0"/>
+              </a:spcBef>
+              <a:spcAft>
+                <a:spcPts val="0"/>
+              </a:spcAft>
+              <a:buNone/>
+            </a:pPr>
+            <a:r>
+              <a:t/>
+            </a:r>
+            <a:endParaRPr/>
+          </a:p>
           <a:p>
             <a:pPr indent="0" lvl="0" marL="0" rtl="0" algn="l">
               <a:spcBef>
@@ -1420,7 +1430,7 @@
   <p:cSld>
     <p:spTree>
       <p:nvGrpSpPr>
-        <p:cNvPr id="178" name="Shape 178"/>
+        <p:cNvPr id="182" name="Shape 182"/>
         <p:cNvGrpSpPr/>
         <p:nvPr/>
       </p:nvGrpSpPr>
@@ -1434,7 +1444,7 @@
       </p:grpSpPr>
       <p:sp>
         <p:nvSpPr>
-          <p:cNvPr id="179" name="Google Shape;179;gfefa4b260b_0_37:notes"/>
+          <p:cNvPr id="183" name="Google Shape;183;gfefa4b260b_0_68:notes"/>
           <p:cNvSpPr/>
           <p:nvPr>
             <p:ph idx="2" type="sldImg"/>
@@ -1469,349 +1479,7 @@
       </p:sp>
       <p:sp>
         <p:nvSpPr>
-          <p:cNvPr id="180" name="Google Shape;180;gfefa4b260b_0_37:notes"/>
-          <p:cNvSpPr txBox="1"/>
-          <p:nvPr>
-            <p:ph idx="1" type="body"/>
-          </p:nvPr>
-        </p:nvSpPr>
-        <p:spPr>
-          <a:xfrm>
-            <a:off x="685800" y="4343400"/>
-            <a:ext cx="5486400" cy="4114800"/>
-          </a:xfrm>
-          <a:prstGeom prst="rect">
-            <a:avLst/>
-          </a:prstGeom>
-        </p:spPr>
-        <p:txBody>
-          <a:bodyPr anchorCtr="0" anchor="t" bIns="91425" lIns="91425" spcFirstLastPara="1" rIns="91425" wrap="square" tIns="91425">
-            <a:noAutofit/>
-          </a:bodyPr>
-          <a:lstStyle/>
-          <a:p>
-            <a:pPr indent="0" lvl="0" marL="0" rtl="0" algn="l">
-              <a:spcBef>
-                <a:spcPts val="0"/>
-              </a:spcBef>
-              <a:spcAft>
-                <a:spcPts val="0"/>
-              </a:spcAft>
-              <a:buNone/>
-            </a:pPr>
-            <a:r>
-              <a:t/>
-            </a:r>
-            <a:endParaRPr/>
-          </a:p>
-          <a:p>
-            <a:pPr indent="0" lvl="0" marL="0" rtl="0" algn="l">
-              <a:spcBef>
-                <a:spcPts val="0"/>
-              </a:spcBef>
-              <a:spcAft>
-                <a:spcPts val="0"/>
-              </a:spcAft>
-              <a:buNone/>
-            </a:pPr>
-            <a:r>
-              <a:t/>
-            </a:r>
-            <a:endParaRPr/>
-          </a:p>
-        </p:txBody>
-      </p:sp>
-    </p:spTree>
-  </p:cSld>
-  <p:clrMapOvr>
-    <a:masterClrMapping/>
-  </p:clrMapOvr>
-</p:notes>
-</file>
-
-<file path=ppt/notesSlides/notesSlide17.xml><?xml version="1.0" encoding="utf-8"?>
-<p:notes xmlns:a="http://schemas.openxmlformats.org/drawingml/2006/main" xmlns:r="http://schemas.openxmlformats.org/officeDocument/2006/relationships" xmlns:mc="http://schemas.openxmlformats.org/markup-compatibility/2006" xmlns:mv="urn:schemas-microsoft-com:mac:vml" xmlns:p="http://schemas.openxmlformats.org/presentationml/2006/main" xmlns:c="http://schemas.openxmlformats.org/drawingml/2006/chart" xmlns:dgm="http://schemas.openxmlformats.org/drawingml/2006/diagram" xmlns:o="urn:schemas-microsoft-com:office:office" xmlns:v="urn:schemas-microsoft-com:vml" xmlns:pvml="urn:schemas-microsoft-com:office:powerpoint" xmlns:com="http://schemas.openxmlformats.org/drawingml/2006/compatibility" xmlns:p14="http://schemas.microsoft.com/office/powerpoint/2010/main" xmlns:p15="http://schemas.microsoft.com/office/powerpoint/2012/main" xmlns:ahyp="http://schemas.microsoft.com/office/drawing/2018/hyperlinkcolor" showMasterPhAnim="0" showMasterSp="0">
-  <p:cSld>
-    <p:spTree>
-      <p:nvGrpSpPr>
-        <p:cNvPr id="184" name="Shape 184"/>
-        <p:cNvGrpSpPr/>
-        <p:nvPr/>
-      </p:nvGrpSpPr>
-      <p:grpSpPr>
-        <a:xfrm>
-          <a:off x="0" y="0"/>
-          <a:ext cx="0" cy="0"/>
-          <a:chOff x="0" y="0"/>
-          <a:chExt cx="0" cy="0"/>
-        </a:xfrm>
-      </p:grpSpPr>
-      <p:sp>
-        <p:nvSpPr>
-          <p:cNvPr id="185" name="Google Shape;185;gfefa4b260b_0_53:notes"/>
-          <p:cNvSpPr/>
-          <p:nvPr>
-            <p:ph idx="2" type="sldImg"/>
-          </p:nvPr>
-        </p:nvSpPr>
-        <p:spPr>
-          <a:xfrm>
-            <a:off x="381300" y="685800"/>
-            <a:ext cx="6096000" cy="3429000"/>
-          </a:xfrm>
-          <a:custGeom>
-            <a:rect b="b" l="l" r="r" t="t"/>
-            <a:pathLst>
-              <a:path extrusionOk="0" h="120000" w="120000">
-                <a:moveTo>
-                  <a:pt x="0" y="0"/>
-                </a:moveTo>
-                <a:lnTo>
-                  <a:pt x="120000" y="0"/>
-                </a:lnTo>
-                <a:lnTo>
-                  <a:pt x="120000" y="120000"/>
-                </a:lnTo>
-                <a:lnTo>
-                  <a:pt x="0" y="120000"/>
-                </a:lnTo>
-                <a:close/>
-              </a:path>
-            </a:pathLst>
-          </a:custGeom>
-        </p:spPr>
-      </p:sp>
-      <p:sp>
-        <p:nvSpPr>
-          <p:cNvPr id="186" name="Google Shape;186;gfefa4b260b_0_53:notes"/>
-          <p:cNvSpPr txBox="1"/>
-          <p:nvPr>
-            <p:ph idx="1" type="body"/>
-          </p:nvPr>
-        </p:nvSpPr>
-        <p:spPr>
-          <a:xfrm>
-            <a:off x="685800" y="4343400"/>
-            <a:ext cx="5486400" cy="4114800"/>
-          </a:xfrm>
-          <a:prstGeom prst="rect">
-            <a:avLst/>
-          </a:prstGeom>
-        </p:spPr>
-        <p:txBody>
-          <a:bodyPr anchorCtr="0" anchor="t" bIns="91425" lIns="91425" spcFirstLastPara="1" rIns="91425" wrap="square" tIns="91425">
-            <a:noAutofit/>
-          </a:bodyPr>
-          <a:lstStyle/>
-          <a:p>
-            <a:pPr indent="0" lvl="0" marL="0" rtl="0" algn="l">
-              <a:spcBef>
-                <a:spcPts val="0"/>
-              </a:spcBef>
-              <a:spcAft>
-                <a:spcPts val="0"/>
-              </a:spcAft>
-              <a:buNone/>
-            </a:pPr>
-            <a:r>
-              <a:t/>
-            </a:r>
-            <a:endParaRPr/>
-          </a:p>
-          <a:p>
-            <a:pPr indent="0" lvl="0" marL="0" rtl="0" algn="l">
-              <a:spcBef>
-                <a:spcPts val="0"/>
-              </a:spcBef>
-              <a:spcAft>
-                <a:spcPts val="0"/>
-              </a:spcAft>
-              <a:buNone/>
-            </a:pPr>
-            <a:r>
-              <a:t/>
-            </a:r>
-            <a:endParaRPr/>
-          </a:p>
-        </p:txBody>
-      </p:sp>
-    </p:spTree>
-  </p:cSld>
-  <p:clrMapOvr>
-    <a:masterClrMapping/>
-  </p:clrMapOvr>
-</p:notes>
-</file>
-
-<file path=ppt/notesSlides/notesSlide18.xml><?xml version="1.0" encoding="utf-8"?>
-<p:notes xmlns:a="http://schemas.openxmlformats.org/drawingml/2006/main" xmlns:r="http://schemas.openxmlformats.org/officeDocument/2006/relationships" xmlns:mc="http://schemas.openxmlformats.org/markup-compatibility/2006" xmlns:mv="urn:schemas-microsoft-com:mac:vml" xmlns:p="http://schemas.openxmlformats.org/presentationml/2006/main" xmlns:c="http://schemas.openxmlformats.org/drawingml/2006/chart" xmlns:dgm="http://schemas.openxmlformats.org/drawingml/2006/diagram" xmlns:o="urn:schemas-microsoft-com:office:office" xmlns:v="urn:schemas-microsoft-com:vml" xmlns:pvml="urn:schemas-microsoft-com:office:powerpoint" xmlns:com="http://schemas.openxmlformats.org/drawingml/2006/compatibility" xmlns:p14="http://schemas.microsoft.com/office/powerpoint/2010/main" xmlns:p15="http://schemas.microsoft.com/office/powerpoint/2012/main" xmlns:ahyp="http://schemas.microsoft.com/office/drawing/2018/hyperlinkcolor" showMasterPhAnim="0" showMasterSp="0">
-  <p:cSld>
-    <p:spTree>
-      <p:nvGrpSpPr>
-        <p:cNvPr id="191" name="Shape 191"/>
-        <p:cNvGrpSpPr/>
-        <p:nvPr/>
-      </p:nvGrpSpPr>
-      <p:grpSpPr>
-        <a:xfrm>
-          <a:off x="0" y="0"/>
-          <a:ext cx="0" cy="0"/>
-          <a:chOff x="0" y="0"/>
-          <a:chExt cx="0" cy="0"/>
-        </a:xfrm>
-      </p:grpSpPr>
-      <p:sp>
-        <p:nvSpPr>
-          <p:cNvPr id="192" name="Google Shape;192;gfefa4b260b_0_58:notes"/>
-          <p:cNvSpPr/>
-          <p:nvPr>
-            <p:ph idx="2" type="sldImg"/>
-          </p:nvPr>
-        </p:nvSpPr>
-        <p:spPr>
-          <a:xfrm>
-            <a:off x="381300" y="685800"/>
-            <a:ext cx="6096000" cy="3429000"/>
-          </a:xfrm>
-          <a:custGeom>
-            <a:rect b="b" l="l" r="r" t="t"/>
-            <a:pathLst>
-              <a:path extrusionOk="0" h="120000" w="120000">
-                <a:moveTo>
-                  <a:pt x="0" y="0"/>
-                </a:moveTo>
-                <a:lnTo>
-                  <a:pt x="120000" y="0"/>
-                </a:lnTo>
-                <a:lnTo>
-                  <a:pt x="120000" y="120000"/>
-                </a:lnTo>
-                <a:lnTo>
-                  <a:pt x="0" y="120000"/>
-                </a:lnTo>
-                <a:close/>
-              </a:path>
-            </a:pathLst>
-          </a:custGeom>
-        </p:spPr>
-      </p:sp>
-      <p:sp>
-        <p:nvSpPr>
-          <p:cNvPr id="193" name="Google Shape;193;gfefa4b260b_0_58:notes"/>
-          <p:cNvSpPr txBox="1"/>
-          <p:nvPr>
-            <p:ph idx="1" type="body"/>
-          </p:nvPr>
-        </p:nvSpPr>
-        <p:spPr>
-          <a:xfrm>
-            <a:off x="685800" y="4343400"/>
-            <a:ext cx="5486400" cy="4114800"/>
-          </a:xfrm>
-          <a:prstGeom prst="rect">
-            <a:avLst/>
-          </a:prstGeom>
-        </p:spPr>
-        <p:txBody>
-          <a:bodyPr anchorCtr="0" anchor="t" bIns="91425" lIns="91425" spcFirstLastPara="1" rIns="91425" wrap="square" tIns="91425">
-            <a:noAutofit/>
-          </a:bodyPr>
-          <a:lstStyle/>
-          <a:p>
-            <a:pPr indent="0" lvl="0" marL="0" rtl="0" algn="l">
-              <a:spcBef>
-                <a:spcPts val="0"/>
-              </a:spcBef>
-              <a:spcAft>
-                <a:spcPts val="0"/>
-              </a:spcAft>
-              <a:buNone/>
-            </a:pPr>
-            <a:r>
-              <a:t/>
-            </a:r>
-            <a:endParaRPr/>
-          </a:p>
-          <a:p>
-            <a:pPr indent="0" lvl="0" marL="0" rtl="0" algn="l">
-              <a:spcBef>
-                <a:spcPts val="0"/>
-              </a:spcBef>
-              <a:spcAft>
-                <a:spcPts val="0"/>
-              </a:spcAft>
-              <a:buNone/>
-            </a:pPr>
-            <a:r>
-              <a:t/>
-            </a:r>
-            <a:endParaRPr/>
-          </a:p>
-        </p:txBody>
-      </p:sp>
-    </p:spTree>
-  </p:cSld>
-  <p:clrMapOvr>
-    <a:masterClrMapping/>
-  </p:clrMapOvr>
-</p:notes>
-</file>
-
-<file path=ppt/notesSlides/notesSlide19.xml><?xml version="1.0" encoding="utf-8"?>
-<p:notes xmlns:a="http://schemas.openxmlformats.org/drawingml/2006/main" xmlns:r="http://schemas.openxmlformats.org/officeDocument/2006/relationships" xmlns:mc="http://schemas.openxmlformats.org/markup-compatibility/2006" xmlns:mv="urn:schemas-microsoft-com:mac:vml" xmlns:p="http://schemas.openxmlformats.org/presentationml/2006/main" xmlns:c="http://schemas.openxmlformats.org/drawingml/2006/chart" xmlns:dgm="http://schemas.openxmlformats.org/drawingml/2006/diagram" xmlns:o="urn:schemas-microsoft-com:office:office" xmlns:v="urn:schemas-microsoft-com:vml" xmlns:pvml="urn:schemas-microsoft-com:office:powerpoint" xmlns:com="http://schemas.openxmlformats.org/drawingml/2006/compatibility" xmlns:p14="http://schemas.microsoft.com/office/powerpoint/2010/main" xmlns:p15="http://schemas.microsoft.com/office/powerpoint/2012/main" xmlns:ahyp="http://schemas.microsoft.com/office/drawing/2018/hyperlinkcolor" showMasterPhAnim="0" showMasterSp="0">
-  <p:cSld>
-    <p:spTree>
-      <p:nvGrpSpPr>
-        <p:cNvPr id="198" name="Shape 198"/>
-        <p:cNvGrpSpPr/>
-        <p:nvPr/>
-      </p:nvGrpSpPr>
-      <p:grpSpPr>
-        <a:xfrm>
-          <a:off x="0" y="0"/>
-          <a:ext cx="0" cy="0"/>
-          <a:chOff x="0" y="0"/>
-          <a:chExt cx="0" cy="0"/>
-        </a:xfrm>
-      </p:grpSpPr>
-      <p:sp>
-        <p:nvSpPr>
-          <p:cNvPr id="199" name="Google Shape;199;gfefa4b260b_0_68:notes"/>
-          <p:cNvSpPr/>
-          <p:nvPr>
-            <p:ph idx="2" type="sldImg"/>
-          </p:nvPr>
-        </p:nvSpPr>
-        <p:spPr>
-          <a:xfrm>
-            <a:off x="381300" y="685800"/>
-            <a:ext cx="6096000" cy="3429000"/>
-          </a:xfrm>
-          <a:custGeom>
-            <a:rect b="b" l="l" r="r" t="t"/>
-            <a:pathLst>
-              <a:path extrusionOk="0" h="120000" w="120000">
-                <a:moveTo>
-                  <a:pt x="0" y="0"/>
-                </a:moveTo>
-                <a:lnTo>
-                  <a:pt x="120000" y="0"/>
-                </a:lnTo>
-                <a:lnTo>
-                  <a:pt x="120000" y="120000"/>
-                </a:lnTo>
-                <a:lnTo>
-                  <a:pt x="0" y="120000"/>
-                </a:lnTo>
-                <a:close/>
-              </a:path>
-            </a:pathLst>
-          </a:custGeom>
-        </p:spPr>
-      </p:sp>
-      <p:sp>
-        <p:nvSpPr>
-          <p:cNvPr id="200" name="Google Shape;200;gfefa4b260b_0_68:notes"/>
+          <p:cNvPr id="184" name="Google Shape;184;gfefa4b260b_0_68:notes"/>
           <p:cNvSpPr txBox="1"/>
           <p:nvPr>
             <p:ph idx="1" type="body"/>
@@ -1960,219 +1628,6 @@
             </a:r>
             <a:endParaRPr/>
           </a:p>
-          <a:p>
-            <a:pPr indent="0" lvl="0" marL="0" rtl="0" algn="l">
-              <a:spcBef>
-                <a:spcPts val="0"/>
-              </a:spcBef>
-              <a:spcAft>
-                <a:spcPts val="0"/>
-              </a:spcAft>
-              <a:buNone/>
-            </a:pPr>
-            <a:r>
-              <a:t/>
-            </a:r>
-            <a:endParaRPr/>
-          </a:p>
-        </p:txBody>
-      </p:sp>
-    </p:spTree>
-  </p:cSld>
-  <p:clrMapOvr>
-    <a:masterClrMapping/>
-  </p:clrMapOvr>
-</p:notes>
-</file>
-
-<file path=ppt/notesSlides/notesSlide20.xml><?xml version="1.0" encoding="utf-8"?>
-<p:notes xmlns:a="http://schemas.openxmlformats.org/drawingml/2006/main" xmlns:r="http://schemas.openxmlformats.org/officeDocument/2006/relationships" xmlns:mc="http://schemas.openxmlformats.org/markup-compatibility/2006" xmlns:mv="urn:schemas-microsoft-com:mac:vml" xmlns:p="http://schemas.openxmlformats.org/presentationml/2006/main" xmlns:c="http://schemas.openxmlformats.org/drawingml/2006/chart" xmlns:dgm="http://schemas.openxmlformats.org/drawingml/2006/diagram" xmlns:o="urn:schemas-microsoft-com:office:office" xmlns:v="urn:schemas-microsoft-com:vml" xmlns:pvml="urn:schemas-microsoft-com:office:powerpoint" xmlns:com="http://schemas.openxmlformats.org/drawingml/2006/compatibility" xmlns:p14="http://schemas.microsoft.com/office/powerpoint/2010/main" xmlns:p15="http://schemas.microsoft.com/office/powerpoint/2012/main" xmlns:ahyp="http://schemas.microsoft.com/office/drawing/2018/hyperlinkcolor" showMasterPhAnim="0" showMasterSp="0">
-  <p:cSld>
-    <p:spTree>
-      <p:nvGrpSpPr>
-        <p:cNvPr id="206" name="Shape 206"/>
-        <p:cNvGrpSpPr/>
-        <p:nvPr/>
-      </p:nvGrpSpPr>
-      <p:grpSpPr>
-        <a:xfrm>
-          <a:off x="0" y="0"/>
-          <a:ext cx="0" cy="0"/>
-          <a:chOff x="0" y="0"/>
-          <a:chExt cx="0" cy="0"/>
-        </a:xfrm>
-      </p:grpSpPr>
-      <p:sp>
-        <p:nvSpPr>
-          <p:cNvPr id="207" name="Google Shape;207;gfefa4b260b_0_72:notes"/>
-          <p:cNvSpPr/>
-          <p:nvPr>
-            <p:ph idx="2" type="sldImg"/>
-          </p:nvPr>
-        </p:nvSpPr>
-        <p:spPr>
-          <a:xfrm>
-            <a:off x="381300" y="685800"/>
-            <a:ext cx="6096000" cy="3429000"/>
-          </a:xfrm>
-          <a:custGeom>
-            <a:rect b="b" l="l" r="r" t="t"/>
-            <a:pathLst>
-              <a:path extrusionOk="0" h="120000" w="120000">
-                <a:moveTo>
-                  <a:pt x="0" y="0"/>
-                </a:moveTo>
-                <a:lnTo>
-                  <a:pt x="120000" y="0"/>
-                </a:lnTo>
-                <a:lnTo>
-                  <a:pt x="120000" y="120000"/>
-                </a:lnTo>
-                <a:lnTo>
-                  <a:pt x="0" y="120000"/>
-                </a:lnTo>
-                <a:close/>
-              </a:path>
-            </a:pathLst>
-          </a:custGeom>
-        </p:spPr>
-      </p:sp>
-      <p:sp>
-        <p:nvSpPr>
-          <p:cNvPr id="208" name="Google Shape;208;gfefa4b260b_0_72:notes"/>
-          <p:cNvSpPr txBox="1"/>
-          <p:nvPr>
-            <p:ph idx="1" type="body"/>
-          </p:nvPr>
-        </p:nvSpPr>
-        <p:spPr>
-          <a:xfrm>
-            <a:off x="685800" y="4343400"/>
-            <a:ext cx="5486400" cy="4114800"/>
-          </a:xfrm>
-          <a:prstGeom prst="rect">
-            <a:avLst/>
-          </a:prstGeom>
-        </p:spPr>
-        <p:txBody>
-          <a:bodyPr anchorCtr="0" anchor="t" bIns="91425" lIns="91425" spcFirstLastPara="1" rIns="91425" wrap="square" tIns="91425">
-            <a:noAutofit/>
-          </a:bodyPr>
-          <a:lstStyle/>
-          <a:p>
-            <a:pPr indent="0" lvl="0" marL="0" rtl="0" algn="l">
-              <a:spcBef>
-                <a:spcPts val="0"/>
-              </a:spcBef>
-              <a:spcAft>
-                <a:spcPts val="0"/>
-              </a:spcAft>
-              <a:buNone/>
-            </a:pPr>
-            <a:r>
-              <a:t/>
-            </a:r>
-            <a:endParaRPr/>
-          </a:p>
-          <a:p>
-            <a:pPr indent="0" lvl="0" marL="0" rtl="0" algn="l">
-              <a:spcBef>
-                <a:spcPts val="0"/>
-              </a:spcBef>
-              <a:spcAft>
-                <a:spcPts val="0"/>
-              </a:spcAft>
-              <a:buNone/>
-            </a:pPr>
-            <a:r>
-              <a:t/>
-            </a:r>
-            <a:endParaRPr/>
-          </a:p>
-        </p:txBody>
-      </p:sp>
-    </p:spTree>
-  </p:cSld>
-  <p:clrMapOvr>
-    <a:masterClrMapping/>
-  </p:clrMapOvr>
-</p:notes>
-</file>
-
-<file path=ppt/notesSlides/notesSlide21.xml><?xml version="1.0" encoding="utf-8"?>
-<p:notes xmlns:a="http://schemas.openxmlformats.org/drawingml/2006/main" xmlns:r="http://schemas.openxmlformats.org/officeDocument/2006/relationships" xmlns:mc="http://schemas.openxmlformats.org/markup-compatibility/2006" xmlns:mv="urn:schemas-microsoft-com:mac:vml" xmlns:p="http://schemas.openxmlformats.org/presentationml/2006/main" xmlns:c="http://schemas.openxmlformats.org/drawingml/2006/chart" xmlns:dgm="http://schemas.openxmlformats.org/drawingml/2006/diagram" xmlns:o="urn:schemas-microsoft-com:office:office" xmlns:v="urn:schemas-microsoft-com:vml" xmlns:pvml="urn:schemas-microsoft-com:office:powerpoint" xmlns:com="http://schemas.openxmlformats.org/drawingml/2006/compatibility" xmlns:p14="http://schemas.microsoft.com/office/powerpoint/2010/main" xmlns:p15="http://schemas.microsoft.com/office/powerpoint/2012/main" xmlns:ahyp="http://schemas.microsoft.com/office/drawing/2018/hyperlinkcolor" showMasterPhAnim="0" showMasterSp="0">
-  <p:cSld>
-    <p:spTree>
-      <p:nvGrpSpPr>
-        <p:cNvPr id="213" name="Shape 213"/>
-        <p:cNvGrpSpPr/>
-        <p:nvPr/>
-      </p:nvGrpSpPr>
-      <p:grpSpPr>
-        <a:xfrm>
-          <a:off x="0" y="0"/>
-          <a:ext cx="0" cy="0"/>
-          <a:chOff x="0" y="0"/>
-          <a:chExt cx="0" cy="0"/>
-        </a:xfrm>
-      </p:grpSpPr>
-      <p:sp>
-        <p:nvSpPr>
-          <p:cNvPr id="214" name="Google Shape;214;g13af23633b8_0_0:notes"/>
-          <p:cNvSpPr/>
-          <p:nvPr>
-            <p:ph idx="2" type="sldImg"/>
-          </p:nvPr>
-        </p:nvSpPr>
-        <p:spPr>
-          <a:xfrm>
-            <a:off x="381300" y="685800"/>
-            <a:ext cx="6096000" cy="3429000"/>
-          </a:xfrm>
-          <a:custGeom>
-            <a:rect b="b" l="l" r="r" t="t"/>
-            <a:pathLst>
-              <a:path extrusionOk="0" h="120000" w="120000">
-                <a:moveTo>
-                  <a:pt x="0" y="0"/>
-                </a:moveTo>
-                <a:lnTo>
-                  <a:pt x="120000" y="0"/>
-                </a:lnTo>
-                <a:lnTo>
-                  <a:pt x="120000" y="120000"/>
-                </a:lnTo>
-                <a:lnTo>
-                  <a:pt x="0" y="120000"/>
-                </a:lnTo>
-                <a:close/>
-              </a:path>
-            </a:pathLst>
-          </a:custGeom>
-        </p:spPr>
-      </p:sp>
-      <p:sp>
-        <p:nvSpPr>
-          <p:cNvPr id="215" name="Google Shape;215;g13af23633b8_0_0:notes"/>
-          <p:cNvSpPr txBox="1"/>
-          <p:nvPr>
-            <p:ph idx="1" type="body"/>
-          </p:nvPr>
-        </p:nvSpPr>
-        <p:spPr>
-          <a:xfrm>
-            <a:off x="685800" y="4343400"/>
-            <a:ext cx="5486400" cy="4114800"/>
-          </a:xfrm>
-          <a:prstGeom prst="rect">
-            <a:avLst/>
-          </a:prstGeom>
-        </p:spPr>
-        <p:txBody>
-          <a:bodyPr anchorCtr="0" anchor="t" bIns="91425" lIns="91425" spcFirstLastPara="1" rIns="91425" wrap="square" tIns="91425">
-            <a:noAutofit/>
-          </a:bodyPr>
-          <a:lstStyle/>
           <a:p>
             <a:pPr indent="0" lvl="0" marL="0" rtl="0" algn="l">
               <a:spcBef>
@@ -7908,7 +7363,7 @@
         </p:blipFill>
         <p:spPr>
           <a:xfrm>
-            <a:off x="3575000" y="260700"/>
+            <a:off x="3828550" y="271800"/>
             <a:ext cx="5318500" cy="1831950"/>
           </a:xfrm>
           <a:prstGeom prst="rect">
@@ -7992,8 +7447,8 @@
         </p:blipFill>
         <p:spPr>
           <a:xfrm>
-            <a:off x="136050" y="1311475"/>
-            <a:ext cx="3267050" cy="3565651"/>
+            <a:off x="14300" y="700450"/>
+            <a:ext cx="3887850" cy="4243200"/>
           </a:xfrm>
           <a:prstGeom prst="rect">
             <a:avLst/>
@@ -8077,18 +7532,6 @@
 <file path=ppt/slides/slide11.xml><?xml version="1.0" encoding="utf-8"?>
 <p:sld xmlns:a="http://schemas.openxmlformats.org/drawingml/2006/main" xmlns:r="http://schemas.openxmlformats.org/officeDocument/2006/relationships" xmlns:mc="http://schemas.openxmlformats.org/markup-compatibility/2006" xmlns:mv="urn:schemas-microsoft-com:mac:vml" xmlns:p="http://schemas.openxmlformats.org/presentationml/2006/main" xmlns:c="http://schemas.openxmlformats.org/drawingml/2006/chart" xmlns:dgm="http://schemas.openxmlformats.org/drawingml/2006/diagram" xmlns:o="urn:schemas-microsoft-com:office:office" xmlns:v="urn:schemas-microsoft-com:vml" xmlns:pvml="urn:schemas-microsoft-com:office:powerpoint" xmlns:com="http://schemas.openxmlformats.org/drawingml/2006/compatibility" xmlns:p14="http://schemas.microsoft.com/office/powerpoint/2010/main" xmlns:p15="http://schemas.microsoft.com/office/powerpoint/2012/main" xmlns:ahyp="http://schemas.microsoft.com/office/drawing/2018/hyperlinkcolor">
   <p:cSld>
-    <p:bg>
-      <p:bgPr>
-        <a:blipFill>
-          <a:blip r:embed="rId3">
-            <a:alphaModFix/>
-          </a:blip>
-          <a:stretch>
-            <a:fillRect/>
-          </a:stretch>
-        </a:blipFill>
-      </p:bgPr>
-    </p:bg>
     <p:spTree>
       <p:nvGrpSpPr>
         <p:cNvPr id="140" name="Shape 140"/>
@@ -8103,86 +7546,9 @@
           <a:chExt cx="0" cy="0"/>
         </a:xfrm>
       </p:grpSpPr>
-      <p:sp>
-        <p:nvSpPr>
-          <p:cNvPr id="141" name="Google Shape;141;p23"/>
-          <p:cNvSpPr txBox="1"/>
-          <p:nvPr>
-            <p:ph idx="1" type="subTitle"/>
-          </p:nvPr>
-        </p:nvSpPr>
-        <p:spPr>
-          <a:xfrm>
-            <a:off x="298825" y="1487500"/>
-            <a:ext cx="7934100" cy="873300"/>
-          </a:xfrm>
-          <a:prstGeom prst="rect">
-            <a:avLst/>
-          </a:prstGeom>
-        </p:spPr>
-        <p:txBody>
-          <a:bodyPr anchorCtr="0" anchor="t" bIns="91425" lIns="91425" spcFirstLastPara="1" rIns="91425" wrap="square" tIns="91425">
-            <a:normAutofit/>
-          </a:bodyPr>
-          <a:lstStyle/>
-          <a:p>
-            <a:pPr indent="0" lvl="0" marL="457200" rtl="0" algn="ctr">
-              <a:lnSpc>
-                <a:spcPct val="90000"/>
-              </a:lnSpc>
-              <a:spcBef>
-                <a:spcPts val="1000"/>
-              </a:spcBef>
-              <a:spcAft>
-                <a:spcPts val="0"/>
-              </a:spcAft>
-              <a:buClr>
-                <a:schemeClr val="dk1"/>
-              </a:buClr>
-              <a:buSzPts val="1100"/>
-              <a:buFont typeface="Arial"/>
-              <a:buNone/>
-            </a:pPr>
-            <a:r>
-              <a:rPr lang="es" sz="4000">
-                <a:solidFill>
-                  <a:schemeClr val="dk1"/>
-                </a:solidFill>
-              </a:rPr>
-              <a:t>Modelos No Supervisados</a:t>
-            </a:r>
-            <a:endParaRPr/>
-          </a:p>
-        </p:txBody>
-      </p:sp>
-    </p:spTree>
-  </p:cSld>
-  <p:clrMapOvr>
-    <a:masterClrMapping/>
-  </p:clrMapOvr>
-</p:sld>
-</file>
-
-<file path=ppt/slides/slide12.xml><?xml version="1.0" encoding="utf-8"?>
-<p:sld xmlns:a="http://schemas.openxmlformats.org/drawingml/2006/main" xmlns:r="http://schemas.openxmlformats.org/officeDocument/2006/relationships" xmlns:mc="http://schemas.openxmlformats.org/markup-compatibility/2006" xmlns:mv="urn:schemas-microsoft-com:mac:vml" xmlns:p="http://schemas.openxmlformats.org/presentationml/2006/main" xmlns:c="http://schemas.openxmlformats.org/drawingml/2006/chart" xmlns:dgm="http://schemas.openxmlformats.org/drawingml/2006/diagram" xmlns:o="urn:schemas-microsoft-com:office:office" xmlns:v="urn:schemas-microsoft-com:vml" xmlns:pvml="urn:schemas-microsoft-com:office:powerpoint" xmlns:com="http://schemas.openxmlformats.org/drawingml/2006/compatibility" xmlns:p14="http://schemas.microsoft.com/office/powerpoint/2010/main" xmlns:p15="http://schemas.microsoft.com/office/powerpoint/2012/main" xmlns:ahyp="http://schemas.microsoft.com/office/drawing/2018/hyperlinkcolor">
-  <p:cSld>
-    <p:spTree>
-      <p:nvGrpSpPr>
-        <p:cNvPr id="145" name="Shape 145"/>
-        <p:cNvGrpSpPr/>
-        <p:nvPr/>
-      </p:nvGrpSpPr>
-      <p:grpSpPr>
-        <a:xfrm>
-          <a:off x="0" y="0"/>
-          <a:ext cx="0" cy="0"/>
-          <a:chOff x="0" y="0"/>
-          <a:chExt cx="0" cy="0"/>
-        </a:xfrm>
-      </p:grpSpPr>
       <p:pic>
         <p:nvPicPr>
-          <p:cNvPr id="146" name="Google Shape;146;p24"/>
+          <p:cNvPr id="141" name="Google Shape;141;p23"/>
           <p:cNvPicPr preferRelativeResize="0"/>
           <p:nvPr/>
         </p:nvPicPr>
@@ -8210,7 +7576,7 @@
       </p:pic>
       <p:sp>
         <p:nvSpPr>
-          <p:cNvPr id="147" name="Google Shape;147;p24"/>
+          <p:cNvPr id="142" name="Google Shape;142;p23"/>
           <p:cNvSpPr txBox="1"/>
           <p:nvPr/>
         </p:nvSpPr>
@@ -8411,7 +7777,7 @@
       </p:sp>
       <p:sp>
         <p:nvSpPr>
-          <p:cNvPr id="148" name="Google Shape;148;p24"/>
+          <p:cNvPr id="143" name="Google Shape;143;p23"/>
           <p:cNvSpPr txBox="1"/>
           <p:nvPr/>
         </p:nvSpPr>
@@ -8487,14 +7853,14 @@
       </p:sp>
       <p:sp>
         <p:nvSpPr>
-          <p:cNvPr id="149" name="Google Shape;149;p24"/>
+          <p:cNvPr id="144" name="Google Shape;144;p23"/>
           <p:cNvSpPr txBox="1"/>
           <p:nvPr/>
         </p:nvSpPr>
         <p:spPr>
           <a:xfrm>
             <a:off x="2663675" y="1281975"/>
-            <a:ext cx="3729000" cy="2852700"/>
+            <a:ext cx="3729000" cy="2611500"/>
           </a:xfrm>
           <a:prstGeom prst="rect">
             <a:avLst/>
@@ -8537,7 +7903,7 @@
                 <a:cs typeface="EB Garamond"/>
                 <a:sym typeface="EB Garamond"/>
               </a:rPr>
-              <a:t>En todos los modelos utilizamos un 80% de los datos como trainer dejando un 20% para test</a:t>
+              <a:t>En todos los modelos utilizamos conjunto train y un conjunto test o de validación</a:t>
             </a:r>
             <a:endParaRPr sz="1566">
               <a:solidFill>
@@ -8590,46 +7956,6 @@
                 <a:sym typeface="EB Garamond"/>
               </a:rPr>
               <a:t> utilizadas </a:t>
-            </a:r>
-            <a:endParaRPr sz="1566">
-              <a:solidFill>
-                <a:schemeClr val="dk1"/>
-              </a:solidFill>
-              <a:latin typeface="EB Garamond"/>
-              <a:ea typeface="EB Garamond"/>
-              <a:cs typeface="EB Garamond"/>
-              <a:sym typeface="EB Garamond"/>
-            </a:endParaRPr>
-          </a:p>
-          <a:p>
-            <a:pPr indent="-328083" lvl="1" marL="914400" marR="0" rtl="0" algn="l">
-              <a:lnSpc>
-                <a:spcPct val="90000"/>
-              </a:lnSpc>
-              <a:spcBef>
-                <a:spcPts val="0"/>
-              </a:spcBef>
-              <a:spcAft>
-                <a:spcPts val="0"/>
-              </a:spcAft>
-              <a:buClr>
-                <a:schemeClr val="dk1"/>
-              </a:buClr>
-              <a:buSzPts val="1567"/>
-              <a:buFont typeface="EB Garamond"/>
-              <a:buChar char="○"/>
-            </a:pPr>
-            <a:r>
-              <a:rPr lang="es" sz="1566">
-                <a:solidFill>
-                  <a:schemeClr val="dk1"/>
-                </a:solidFill>
-                <a:latin typeface="EB Garamond"/>
-                <a:ea typeface="EB Garamond"/>
-                <a:cs typeface="EB Garamond"/>
-                <a:sym typeface="EB Garamond"/>
-              </a:rPr>
-              <a:t>Accuracy</a:t>
             </a:r>
             <a:endParaRPr sz="1050">
               <a:solidFill>
@@ -8820,7 +8146,7 @@
       </p:sp>
       <p:sp>
         <p:nvSpPr>
-          <p:cNvPr id="150" name="Google Shape;150;p24"/>
+          <p:cNvPr id="145" name="Google Shape;145;p23"/>
           <p:cNvSpPr txBox="1"/>
           <p:nvPr/>
         </p:nvSpPr>
@@ -8884,12 +8210,12 @@
 </p:sld>
 </file>
 
-<file path=ppt/slides/slide13.xml><?xml version="1.0" encoding="utf-8"?>
+<file path=ppt/slides/slide12.xml><?xml version="1.0" encoding="utf-8"?>
 <p:sld xmlns:a="http://schemas.openxmlformats.org/drawingml/2006/main" xmlns:r="http://schemas.openxmlformats.org/officeDocument/2006/relationships" xmlns:mc="http://schemas.openxmlformats.org/markup-compatibility/2006" xmlns:mv="urn:schemas-microsoft-com:mac:vml" xmlns:p="http://schemas.openxmlformats.org/presentationml/2006/main" xmlns:c="http://schemas.openxmlformats.org/drawingml/2006/chart" xmlns:dgm="http://schemas.openxmlformats.org/drawingml/2006/diagram" xmlns:o="urn:schemas-microsoft-com:office:office" xmlns:v="urn:schemas-microsoft-com:vml" xmlns:pvml="urn:schemas-microsoft-com:office:powerpoint" xmlns:com="http://schemas.openxmlformats.org/drawingml/2006/compatibility" xmlns:p14="http://schemas.microsoft.com/office/powerpoint/2010/main" xmlns:p15="http://schemas.microsoft.com/office/powerpoint/2012/main" xmlns:ahyp="http://schemas.microsoft.com/office/drawing/2018/hyperlinkcolor">
   <p:cSld>
     <p:spTree>
       <p:nvGrpSpPr>
-        <p:cNvPr id="154" name="Shape 154"/>
+        <p:cNvPr id="149" name="Shape 149"/>
         <p:cNvGrpSpPr/>
         <p:nvPr/>
       </p:nvGrpSpPr>
@@ -8903,7 +8229,7 @@
       </p:grpSpPr>
       <p:pic>
         <p:nvPicPr>
-          <p:cNvPr id="155" name="Google Shape;155;p25"/>
+          <p:cNvPr id="150" name="Google Shape;150;p24"/>
           <p:cNvPicPr preferRelativeResize="0"/>
           <p:nvPr/>
         </p:nvPicPr>
@@ -8931,7 +8257,7 @@
       </p:pic>
       <p:sp>
         <p:nvSpPr>
-          <p:cNvPr id="156" name="Google Shape;156;p25"/>
+          <p:cNvPr id="151" name="Google Shape;151;p24"/>
           <p:cNvSpPr txBox="1"/>
           <p:nvPr/>
         </p:nvSpPr>
@@ -9020,7 +8346,7 @@
       </p:sp>
       <p:sp>
         <p:nvSpPr>
-          <p:cNvPr id="157" name="Google Shape;157;p25"/>
+          <p:cNvPr id="152" name="Google Shape;152;p24"/>
           <p:cNvSpPr txBox="1"/>
           <p:nvPr/>
         </p:nvSpPr>
@@ -9078,7 +8404,7 @@
       </p:sp>
       <p:pic>
         <p:nvPicPr>
-          <p:cNvPr id="158" name="Google Shape;158;p25"/>
+          <p:cNvPr id="153" name="Google Shape;153;p24"/>
           <p:cNvPicPr preferRelativeResize="0"/>
           <p:nvPr/>
         </p:nvPicPr>
@@ -9092,7 +8418,7 @@
         </p:blipFill>
         <p:spPr>
           <a:xfrm>
-            <a:off x="3697050" y="34775"/>
+            <a:off x="3772950" y="307150"/>
             <a:ext cx="5391150" cy="1828800"/>
           </a:xfrm>
           <a:prstGeom prst="rect">
@@ -9106,7 +8432,7 @@
       </p:pic>
       <p:pic>
         <p:nvPicPr>
-          <p:cNvPr id="159" name="Google Shape;159;p25"/>
+          <p:cNvPr id="154" name="Google Shape;154;p24"/>
           <p:cNvPicPr preferRelativeResize="0"/>
           <p:nvPr/>
         </p:nvPicPr>
@@ -9122,6 +8448,243 @@
           <a:xfrm>
             <a:off x="323850" y="2191375"/>
             <a:ext cx="3449107" cy="2771150"/>
+          </a:xfrm>
+          <a:prstGeom prst="rect">
+            <a:avLst/>
+          </a:prstGeom>
+          <a:noFill/>
+          <a:ln>
+            <a:noFill/>
+          </a:ln>
+        </p:spPr>
+      </p:pic>
+    </p:spTree>
+  </p:cSld>
+  <p:clrMapOvr>
+    <a:masterClrMapping/>
+  </p:clrMapOvr>
+</p:sld>
+</file>
+
+<file path=ppt/slides/slide13.xml><?xml version="1.0" encoding="utf-8"?>
+<p:sld xmlns:a="http://schemas.openxmlformats.org/drawingml/2006/main" xmlns:r="http://schemas.openxmlformats.org/officeDocument/2006/relationships" xmlns:mc="http://schemas.openxmlformats.org/markup-compatibility/2006" xmlns:mv="urn:schemas-microsoft-com:mac:vml" xmlns:p="http://schemas.openxmlformats.org/presentationml/2006/main" xmlns:c="http://schemas.openxmlformats.org/drawingml/2006/chart" xmlns:dgm="http://schemas.openxmlformats.org/drawingml/2006/diagram" xmlns:o="urn:schemas-microsoft-com:office:office" xmlns:v="urn:schemas-microsoft-com:vml" xmlns:pvml="urn:schemas-microsoft-com:office:powerpoint" xmlns:com="http://schemas.openxmlformats.org/drawingml/2006/compatibility" xmlns:p14="http://schemas.microsoft.com/office/powerpoint/2010/main" xmlns:p15="http://schemas.microsoft.com/office/powerpoint/2012/main" xmlns:ahyp="http://schemas.microsoft.com/office/drawing/2018/hyperlinkcolor">
+  <p:cSld>
+    <p:spTree>
+      <p:nvGrpSpPr>
+        <p:cNvPr id="158" name="Shape 158"/>
+        <p:cNvGrpSpPr/>
+        <p:nvPr/>
+      </p:nvGrpSpPr>
+      <p:grpSpPr>
+        <a:xfrm>
+          <a:off x="0" y="0"/>
+          <a:ext cx="0" cy="0"/>
+          <a:chOff x="0" y="0"/>
+          <a:chExt cx="0" cy="0"/>
+        </a:xfrm>
+      </p:grpSpPr>
+      <p:pic>
+        <p:nvPicPr>
+          <p:cNvPr id="159" name="Google Shape;159;p25"/>
+          <p:cNvPicPr preferRelativeResize="0"/>
+          <p:nvPr/>
+        </p:nvPicPr>
+        <p:blipFill>
+          <a:blip r:embed="rId3">
+            <a:alphaModFix/>
+          </a:blip>
+          <a:stretch>
+            <a:fillRect/>
+          </a:stretch>
+        </p:blipFill>
+        <p:spPr>
+          <a:xfrm>
+            <a:off x="6349195" y="0"/>
+            <a:ext cx="2794810" cy="5143501"/>
+          </a:xfrm>
+          <a:prstGeom prst="rect">
+            <a:avLst/>
+          </a:prstGeom>
+          <a:noFill/>
+          <a:ln>
+            <a:noFill/>
+          </a:ln>
+        </p:spPr>
+      </p:pic>
+      <p:sp>
+        <p:nvSpPr>
+          <p:cNvPr id="160" name="Google Shape;160;p25"/>
+          <p:cNvSpPr txBox="1"/>
+          <p:nvPr/>
+        </p:nvSpPr>
+        <p:spPr>
+          <a:xfrm>
+            <a:off x="49850" y="109525"/>
+            <a:ext cx="1526700" cy="287400"/>
+          </a:xfrm>
+          <a:prstGeom prst="rect">
+            <a:avLst/>
+          </a:prstGeom>
+          <a:noFill/>
+          <a:ln>
+            <a:noFill/>
+          </a:ln>
+        </p:spPr>
+        <p:txBody>
+          <a:bodyPr anchorCtr="0" anchor="ctr" bIns="0" lIns="91425" spcFirstLastPara="1" rIns="91425" wrap="square" tIns="0">
+            <a:spAutoFit/>
+          </a:bodyPr>
+          <a:lstStyle/>
+          <a:p>
+            <a:pPr indent="0" lvl="0" marL="457200" rtl="0" algn="l">
+              <a:lnSpc>
+                <a:spcPct val="105000"/>
+              </a:lnSpc>
+              <a:spcBef>
+                <a:spcPts val="0"/>
+              </a:spcBef>
+              <a:spcAft>
+                <a:spcPts val="1200"/>
+              </a:spcAft>
+              <a:buNone/>
+            </a:pPr>
+            <a:r>
+              <a:rPr b="1" lang="es" sz="1866">
+                <a:solidFill>
+                  <a:schemeClr val="dk1"/>
+                </a:solidFill>
+                <a:latin typeface="EB Garamond"/>
+                <a:ea typeface="EB Garamond"/>
+                <a:cs typeface="EB Garamond"/>
+                <a:sym typeface="EB Garamond"/>
+              </a:rPr>
+              <a:t>Kmeans:</a:t>
+            </a:r>
+            <a:endParaRPr/>
+          </a:p>
+        </p:txBody>
+      </p:sp>
+      <p:sp>
+        <p:nvSpPr>
+          <p:cNvPr id="161" name="Google Shape;161;p25"/>
+          <p:cNvSpPr txBox="1"/>
+          <p:nvPr/>
+        </p:nvSpPr>
+        <p:spPr>
+          <a:xfrm>
+            <a:off x="49850" y="399938"/>
+            <a:ext cx="3061500" cy="1438500"/>
+          </a:xfrm>
+          <a:prstGeom prst="rect">
+            <a:avLst/>
+          </a:prstGeom>
+          <a:noFill/>
+          <a:ln>
+            <a:noFill/>
+          </a:ln>
+        </p:spPr>
+        <p:txBody>
+          <a:bodyPr anchorCtr="0" anchor="t" bIns="91425" lIns="91425" spcFirstLastPara="1" rIns="91425" wrap="square" tIns="91425">
+            <a:spAutoFit/>
+          </a:bodyPr>
+          <a:lstStyle/>
+          <a:p>
+            <a:pPr indent="-317500" lvl="0" marL="457200" rtl="0" algn="l">
+              <a:lnSpc>
+                <a:spcPct val="105000"/>
+              </a:lnSpc>
+              <a:spcBef>
+                <a:spcPts val="1100"/>
+              </a:spcBef>
+              <a:spcAft>
+                <a:spcPts val="0"/>
+              </a:spcAft>
+              <a:buClr>
+                <a:schemeClr val="dk1"/>
+              </a:buClr>
+              <a:buSzPts val="1400"/>
+              <a:buChar char="●"/>
+            </a:pPr>
+            <a:r>
+              <a:rPr lang="es" sz="1566">
+                <a:solidFill>
+                  <a:schemeClr val="dk1"/>
+                </a:solidFill>
+                <a:latin typeface="EB Garamond"/>
+                <a:ea typeface="EB Garamond"/>
+                <a:cs typeface="EB Garamond"/>
+                <a:sym typeface="EB Garamond"/>
+              </a:rPr>
+              <a:t>Es un método de agrupamiento k grupos en el que cada observación pertenece al grupo cuyo valor medio es más cercano</a:t>
+            </a:r>
+            <a:r>
+              <a:rPr lang="es">
+                <a:solidFill>
+                  <a:schemeClr val="dk1"/>
+                </a:solidFill>
+                <a:highlight>
+                  <a:schemeClr val="lt1"/>
+                </a:highlight>
+              </a:rPr>
+              <a:t>.</a:t>
+            </a:r>
+            <a:endParaRPr>
+              <a:solidFill>
+                <a:schemeClr val="dk1"/>
+              </a:solidFill>
+              <a:highlight>
+                <a:schemeClr val="lt1"/>
+              </a:highlight>
+            </a:endParaRPr>
+          </a:p>
+        </p:txBody>
+      </p:sp>
+      <p:pic>
+        <p:nvPicPr>
+          <p:cNvPr id="162" name="Google Shape;162;p25"/>
+          <p:cNvPicPr preferRelativeResize="0"/>
+          <p:nvPr/>
+        </p:nvPicPr>
+        <p:blipFill>
+          <a:blip r:embed="rId4">
+            <a:alphaModFix/>
+          </a:blip>
+          <a:stretch>
+            <a:fillRect/>
+          </a:stretch>
+        </p:blipFill>
+        <p:spPr>
+          <a:xfrm>
+            <a:off x="3385300" y="152400"/>
+            <a:ext cx="5248275" cy="1933575"/>
+          </a:xfrm>
+          <a:prstGeom prst="rect">
+            <a:avLst/>
+          </a:prstGeom>
+          <a:noFill/>
+          <a:ln>
+            <a:noFill/>
+          </a:ln>
+        </p:spPr>
+      </p:pic>
+      <p:pic>
+        <p:nvPicPr>
+          <p:cNvPr id="163" name="Google Shape;163;p25"/>
+          <p:cNvPicPr preferRelativeResize="0"/>
+          <p:nvPr/>
+        </p:nvPicPr>
+        <p:blipFill>
+          <a:blip r:embed="rId5">
+            <a:alphaModFix/>
+          </a:blip>
+          <a:stretch>
+            <a:fillRect/>
+          </a:stretch>
+        </p:blipFill>
+        <p:spPr>
+          <a:xfrm>
+            <a:off x="257025" y="2189600"/>
+            <a:ext cx="3384084" cy="2752725"/>
           </a:xfrm>
           <a:prstGeom prst="rect">
             <a:avLst/>
@@ -9145,7 +8708,7 @@
   <p:cSld>
     <p:spTree>
       <p:nvGrpSpPr>
-        <p:cNvPr id="163" name="Shape 163"/>
+        <p:cNvPr id="167" name="Shape 167"/>
         <p:cNvGrpSpPr/>
         <p:nvPr/>
       </p:nvGrpSpPr>
@@ -9159,7 +8722,7 @@
       </p:grpSpPr>
       <p:pic>
         <p:nvPicPr>
-          <p:cNvPr id="164" name="Google Shape;164;p26"/>
+          <p:cNvPr id="168" name="Google Shape;168;p26"/>
           <p:cNvPicPr preferRelativeResize="0"/>
           <p:nvPr/>
         </p:nvPicPr>
@@ -9187,14 +8750,14 @@
       </p:pic>
       <p:sp>
         <p:nvSpPr>
-          <p:cNvPr id="165" name="Google Shape;165;p26"/>
+          <p:cNvPr id="169" name="Google Shape;169;p26"/>
           <p:cNvSpPr txBox="1"/>
           <p:nvPr/>
         </p:nvSpPr>
         <p:spPr>
           <a:xfrm>
-            <a:off x="375550" y="380125"/>
-            <a:ext cx="1526700" cy="287400"/>
+            <a:off x="0" y="94375"/>
+            <a:ext cx="2775900" cy="671100"/>
           </a:xfrm>
           <a:prstGeom prst="rect">
             <a:avLst/>
@@ -9218,7 +8781,7 @@
                 <a:spcPts val="0"/>
               </a:spcBef>
               <a:spcAft>
-                <a:spcPts val="1200"/>
+                <a:spcPts val="0"/>
               </a:spcAft>
               <a:buNone/>
             </a:pPr>
@@ -9232,7 +8795,43 @@
                 <a:cs typeface="EB Garamond"/>
                 <a:sym typeface="EB Garamond"/>
               </a:rPr>
-              <a:t>Kmeans:</a:t>
+              <a:t>Gaussian Mixture:</a:t>
+            </a:r>
+            <a:r>
+              <a:rPr lang="es">
+                <a:solidFill>
+                  <a:schemeClr val="dk1"/>
+                </a:solidFill>
+                <a:highlight>
+                  <a:schemeClr val="lt1"/>
+                </a:highlight>
+              </a:rPr>
+              <a:t> </a:t>
+            </a:r>
+            <a:endParaRPr>
+              <a:solidFill>
+                <a:schemeClr val="dk1"/>
+              </a:solidFill>
+              <a:highlight>
+                <a:schemeClr val="lt1"/>
+              </a:highlight>
+            </a:endParaRPr>
+          </a:p>
+          <a:p>
+            <a:pPr indent="0" lvl="0" marL="457200" rtl="0" algn="l">
+              <a:lnSpc>
+                <a:spcPct val="105000"/>
+              </a:lnSpc>
+              <a:spcBef>
+                <a:spcPts val="1200"/>
+              </a:spcBef>
+              <a:spcAft>
+                <a:spcPts val="1200"/>
+              </a:spcAft>
+              <a:buNone/>
+            </a:pPr>
+            <a:r>
+              <a:t/>
             </a:r>
             <a:endParaRPr/>
           </a:p>
@@ -9240,14 +8839,14 @@
       </p:sp>
       <p:sp>
         <p:nvSpPr>
-          <p:cNvPr id="166" name="Google Shape;166;p26"/>
+          <p:cNvPr id="170" name="Google Shape;170;p26"/>
           <p:cNvSpPr txBox="1"/>
           <p:nvPr/>
         </p:nvSpPr>
         <p:spPr>
           <a:xfrm>
-            <a:off x="171400" y="751100"/>
-            <a:ext cx="3061500" cy="1438500"/>
+            <a:off x="146925" y="375550"/>
+            <a:ext cx="3290100" cy="1945200"/>
           </a:xfrm>
           <a:prstGeom prst="rect">
             <a:avLst/>
@@ -9263,12 +8862,12 @@
           </a:bodyPr>
           <a:lstStyle/>
           <a:p>
-            <a:pPr indent="-317500" lvl="0" marL="457200" rtl="0" algn="l">
+            <a:pPr indent="-328083" lvl="0" marL="457200" rtl="0" algn="l">
               <a:lnSpc>
                 <a:spcPct val="105000"/>
               </a:lnSpc>
               <a:spcBef>
-                <a:spcPts val="1100"/>
+                <a:spcPts val="0"/>
               </a:spcBef>
               <a:spcAft>
                 <a:spcPts val="0"/>
@@ -9276,7 +8875,8 @@
               <a:buClr>
                 <a:schemeClr val="dk1"/>
               </a:buClr>
-              <a:buSzPts val="1400"/>
+              <a:buSzPts val="1567"/>
+              <a:buFont typeface="EB Garamond"/>
               <a:buChar char="●"/>
             </a:pPr>
             <a:r>
@@ -9289,33 +8889,15 @@
                 <a:cs typeface="EB Garamond"/>
                 <a:sym typeface="EB Garamond"/>
               </a:rPr>
-              <a:t>Es un método de agrupamiento k grupos en el que cada observación pertenece al grupo cuyo valor medio es más cercano</a:t>
-            </a:r>
-            <a:r>
-              <a:rPr lang="es">
-                <a:solidFill>
-                  <a:schemeClr val="dk1"/>
-                </a:solidFill>
-                <a:highlight>
-                  <a:schemeClr val="lt1"/>
-                </a:highlight>
-              </a:rPr>
-              <a:t>.</a:t>
-            </a:r>
-            <a:endParaRPr>
-              <a:solidFill>
-                <a:schemeClr val="dk1"/>
-              </a:solidFill>
-              <a:highlight>
-                <a:schemeClr val="lt1"/>
-              </a:highlight>
-            </a:endParaRPr>
+              <a:t>Es un modelo probabilístico el cual puede entenderse como una generalización de Kmeans en la cual de asignar cada observación a un único cluster, se obtiene una distribución probabilidad de pertenencia a cada uno.</a:t>
+            </a:r>
+            <a:endParaRPr/>
           </a:p>
         </p:txBody>
       </p:sp>
       <p:pic>
         <p:nvPicPr>
-          <p:cNvPr id="167" name="Google Shape;167;p26"/>
+          <p:cNvPr id="171" name="Google Shape;171;p26"/>
           <p:cNvPicPr preferRelativeResize="0"/>
           <p:nvPr/>
         </p:nvPicPr>
@@ -9329,8 +8911,8 @@
         </p:blipFill>
         <p:spPr>
           <a:xfrm>
-            <a:off x="3385300" y="152400"/>
-            <a:ext cx="5248275" cy="1933575"/>
+            <a:off x="3589425" y="152400"/>
+            <a:ext cx="5248275" cy="1866900"/>
           </a:xfrm>
           <a:prstGeom prst="rect">
             <a:avLst/>
@@ -9343,7 +8925,7 @@
       </p:pic>
       <p:pic>
         <p:nvPicPr>
-          <p:cNvPr id="168" name="Google Shape;168;p26"/>
+          <p:cNvPr id="172" name="Google Shape;172;p26"/>
           <p:cNvPicPr preferRelativeResize="0"/>
           <p:nvPr/>
         </p:nvPicPr>
@@ -9357,8 +8939,8 @@
         </p:blipFill>
         <p:spPr>
           <a:xfrm>
-            <a:off x="257025" y="2189600"/>
-            <a:ext cx="3384084" cy="2752725"/>
+            <a:off x="146925" y="2324100"/>
+            <a:ext cx="3455484" cy="2819400"/>
           </a:xfrm>
           <a:prstGeom prst="rect">
             <a:avLst/>
@@ -9382,7 +8964,715 @@
   <p:cSld>
     <p:spTree>
       <p:nvGrpSpPr>
-        <p:cNvPr id="172" name="Shape 172"/>
+        <p:cNvPr id="176" name="Shape 176"/>
+        <p:cNvGrpSpPr/>
+        <p:nvPr/>
+      </p:nvGrpSpPr>
+      <p:grpSpPr>
+        <a:xfrm>
+          <a:off x="0" y="0"/>
+          <a:ext cx="0" cy="0"/>
+          <a:chOff x="0" y="0"/>
+          <a:chExt cx="0" cy="0"/>
+        </a:xfrm>
+      </p:grpSpPr>
+      <p:sp>
+        <p:nvSpPr>
+          <p:cNvPr id="177" name="Google Shape;177;p27"/>
+          <p:cNvSpPr txBox="1"/>
+          <p:nvPr>
+            <p:ph type="title"/>
+          </p:nvPr>
+        </p:nvSpPr>
+        <p:spPr>
+          <a:xfrm>
+            <a:off x="311700" y="456100"/>
+            <a:ext cx="8520600" cy="572700"/>
+          </a:xfrm>
+          <a:prstGeom prst="rect">
+            <a:avLst/>
+          </a:prstGeom>
+        </p:spPr>
+        <p:txBody>
+          <a:bodyPr anchorCtr="0" anchor="t" bIns="91425" lIns="91425" spcFirstLastPara="1" rIns="91425" wrap="square" tIns="91425">
+            <a:normAutofit fontScale="90000"/>
+          </a:bodyPr>
+          <a:lstStyle/>
+          <a:p>
+            <a:pPr indent="0" lvl="0" marL="0" rtl="0" algn="l">
+              <a:lnSpc>
+                <a:spcPct val="90000"/>
+              </a:lnSpc>
+              <a:spcBef>
+                <a:spcPts val="1000"/>
+              </a:spcBef>
+              <a:spcAft>
+                <a:spcPts val="0"/>
+              </a:spcAft>
+              <a:buNone/>
+            </a:pPr>
+            <a:r>
+              <a:rPr b="1" lang="es" sz="1866">
+                <a:latin typeface="EB Garamond"/>
+                <a:ea typeface="EB Garamond"/>
+                <a:cs typeface="EB Garamond"/>
+                <a:sym typeface="EB Garamond"/>
+              </a:rPr>
+              <a:t>Resultados</a:t>
+            </a:r>
+            <a:endParaRPr sz="2650"/>
+          </a:p>
+          <a:p>
+            <a:pPr indent="0" lvl="0" marL="0" rtl="0" algn="l">
+              <a:spcBef>
+                <a:spcPts val="0"/>
+              </a:spcBef>
+              <a:spcAft>
+                <a:spcPts val="0"/>
+              </a:spcAft>
+              <a:buNone/>
+            </a:pPr>
+            <a:r>
+              <a:t/>
+            </a:r>
+            <a:endParaRPr/>
+          </a:p>
+        </p:txBody>
+      </p:sp>
+      <p:pic>
+        <p:nvPicPr>
+          <p:cNvPr id="178" name="Google Shape;178;p27"/>
+          <p:cNvPicPr preferRelativeResize="0"/>
+          <p:nvPr/>
+        </p:nvPicPr>
+        <p:blipFill>
+          <a:blip r:embed="rId3">
+            <a:alphaModFix/>
+          </a:blip>
+          <a:stretch>
+            <a:fillRect/>
+          </a:stretch>
+        </p:blipFill>
+        <p:spPr>
+          <a:xfrm>
+            <a:off x="152400" y="1170125"/>
+            <a:ext cx="8839202" cy="3115529"/>
+          </a:xfrm>
+          <a:prstGeom prst="rect">
+            <a:avLst/>
+          </a:prstGeom>
+          <a:noFill/>
+          <a:ln>
+            <a:noFill/>
+          </a:ln>
+        </p:spPr>
+      </p:pic>
+      <p:sp>
+        <p:nvSpPr>
+          <p:cNvPr id="179" name="Google Shape;179;p27"/>
+          <p:cNvSpPr txBox="1"/>
+          <p:nvPr/>
+        </p:nvSpPr>
+        <p:spPr>
+          <a:xfrm>
+            <a:off x="1366850" y="842500"/>
+            <a:ext cx="3942900" cy="3632700"/>
+          </a:xfrm>
+          <a:prstGeom prst="rect">
+            <a:avLst/>
+          </a:prstGeom>
+          <a:noFill/>
+          <a:ln>
+            <a:noFill/>
+          </a:ln>
+          <a:effectLst>
+            <a:outerShdw blurRad="57150" rotWithShape="0" algn="bl" dir="5400000" dist="19050">
+              <a:srgbClr val="000000">
+                <a:alpha val="50000"/>
+              </a:srgbClr>
+            </a:outerShdw>
+            <a:reflection blurRad="0" dir="5400000" dist="38100" endA="0" fadeDir="5400012" kx="0" rotWithShape="0" algn="bl" stPos="0" sy="-100000" ky="0"/>
+          </a:effectLst>
+        </p:spPr>
+        <p:txBody>
+          <a:bodyPr anchorCtr="0" anchor="t" bIns="91425" lIns="91425" spcFirstLastPara="1" rIns="91425" wrap="square" tIns="91425">
+            <a:spAutoFit/>
+          </a:bodyPr>
+          <a:lstStyle/>
+          <a:p>
+            <a:pPr indent="0" lvl="0" marL="0" rtl="0" algn="l">
+              <a:spcBef>
+                <a:spcPts val="0"/>
+              </a:spcBef>
+              <a:spcAft>
+                <a:spcPts val="0"/>
+              </a:spcAft>
+              <a:buNone/>
+            </a:pPr>
+            <a:r>
+              <a:rPr b="1" lang="es">
+                <a:solidFill>
+                  <a:srgbClr val="FF0000"/>
+                </a:solidFill>
+              </a:rPr>
+              <a:t>No Balanceados</a:t>
+            </a:r>
+            <a:endParaRPr b="1">
+              <a:solidFill>
+                <a:srgbClr val="FF0000"/>
+              </a:solidFill>
+            </a:endParaRPr>
+          </a:p>
+          <a:p>
+            <a:pPr indent="0" lvl="0" marL="0" rtl="0" algn="l">
+              <a:spcBef>
+                <a:spcPts val="0"/>
+              </a:spcBef>
+              <a:spcAft>
+                <a:spcPts val="0"/>
+              </a:spcAft>
+              <a:buNone/>
+            </a:pPr>
+            <a:r>
+              <a:t/>
+            </a:r>
+            <a:endParaRPr/>
+          </a:p>
+          <a:p>
+            <a:pPr indent="0" lvl="0" marL="0" rtl="0" algn="l">
+              <a:spcBef>
+                <a:spcPts val="0"/>
+              </a:spcBef>
+              <a:spcAft>
+                <a:spcPts val="0"/>
+              </a:spcAft>
+              <a:buNone/>
+            </a:pPr>
+            <a:r>
+              <a:t/>
+            </a:r>
+            <a:endParaRPr/>
+          </a:p>
+          <a:p>
+            <a:pPr indent="0" lvl="0" marL="0" rtl="0" algn="l">
+              <a:spcBef>
+                <a:spcPts val="0"/>
+              </a:spcBef>
+              <a:spcAft>
+                <a:spcPts val="0"/>
+              </a:spcAft>
+              <a:buNone/>
+            </a:pPr>
+            <a:r>
+              <a:t/>
+            </a:r>
+            <a:endParaRPr/>
+          </a:p>
+          <a:p>
+            <a:pPr indent="0" lvl="0" marL="0" rtl="0" algn="l">
+              <a:spcBef>
+                <a:spcPts val="0"/>
+              </a:spcBef>
+              <a:spcAft>
+                <a:spcPts val="0"/>
+              </a:spcAft>
+              <a:buNone/>
+            </a:pPr>
+            <a:r>
+              <a:t/>
+            </a:r>
+            <a:endParaRPr/>
+          </a:p>
+          <a:p>
+            <a:pPr indent="0" lvl="0" marL="0" rtl="0" algn="l">
+              <a:spcBef>
+                <a:spcPts val="0"/>
+              </a:spcBef>
+              <a:spcAft>
+                <a:spcPts val="0"/>
+              </a:spcAft>
+              <a:buNone/>
+            </a:pPr>
+            <a:r>
+              <a:t/>
+            </a:r>
+            <a:endParaRPr/>
+          </a:p>
+          <a:p>
+            <a:pPr indent="0" lvl="0" marL="0" rtl="0" algn="l">
+              <a:spcBef>
+                <a:spcPts val="0"/>
+              </a:spcBef>
+              <a:spcAft>
+                <a:spcPts val="0"/>
+              </a:spcAft>
+              <a:buNone/>
+            </a:pPr>
+            <a:r>
+              <a:t/>
+            </a:r>
+            <a:endParaRPr/>
+          </a:p>
+          <a:p>
+            <a:pPr indent="0" lvl="0" marL="0" rtl="0" algn="l">
+              <a:spcBef>
+                <a:spcPts val="0"/>
+              </a:spcBef>
+              <a:spcAft>
+                <a:spcPts val="0"/>
+              </a:spcAft>
+              <a:buNone/>
+            </a:pPr>
+            <a:r>
+              <a:t/>
+            </a:r>
+            <a:endParaRPr/>
+          </a:p>
+          <a:p>
+            <a:pPr indent="0" lvl="0" marL="0" rtl="0" algn="l">
+              <a:spcBef>
+                <a:spcPts val="0"/>
+              </a:spcBef>
+              <a:spcAft>
+                <a:spcPts val="0"/>
+              </a:spcAft>
+              <a:buNone/>
+            </a:pPr>
+            <a:r>
+              <a:t/>
+            </a:r>
+            <a:endParaRPr/>
+          </a:p>
+          <a:p>
+            <a:pPr indent="0" lvl="0" marL="0" rtl="0" algn="l">
+              <a:spcBef>
+                <a:spcPts val="0"/>
+              </a:spcBef>
+              <a:spcAft>
+                <a:spcPts val="0"/>
+              </a:spcAft>
+              <a:buNone/>
+            </a:pPr>
+            <a:r>
+              <a:t/>
+            </a:r>
+            <a:endParaRPr/>
+          </a:p>
+          <a:p>
+            <a:pPr indent="0" lvl="0" marL="0" rtl="0" algn="l">
+              <a:spcBef>
+                <a:spcPts val="0"/>
+              </a:spcBef>
+              <a:spcAft>
+                <a:spcPts val="0"/>
+              </a:spcAft>
+              <a:buNone/>
+            </a:pPr>
+            <a:r>
+              <a:t/>
+            </a:r>
+            <a:endParaRPr/>
+          </a:p>
+          <a:p>
+            <a:pPr indent="0" lvl="0" marL="0" rtl="0" algn="l">
+              <a:spcBef>
+                <a:spcPts val="0"/>
+              </a:spcBef>
+              <a:spcAft>
+                <a:spcPts val="0"/>
+              </a:spcAft>
+              <a:buNone/>
+            </a:pPr>
+            <a:r>
+              <a:t/>
+            </a:r>
+            <a:endParaRPr/>
+          </a:p>
+          <a:p>
+            <a:pPr indent="0" lvl="0" marL="0" rtl="0" algn="l">
+              <a:spcBef>
+                <a:spcPts val="0"/>
+              </a:spcBef>
+              <a:spcAft>
+                <a:spcPts val="0"/>
+              </a:spcAft>
+              <a:buNone/>
+            </a:pPr>
+            <a:r>
+              <a:t/>
+            </a:r>
+            <a:endParaRPr/>
+          </a:p>
+          <a:p>
+            <a:pPr indent="0" lvl="0" marL="0" rtl="0" algn="l">
+              <a:spcBef>
+                <a:spcPts val="0"/>
+              </a:spcBef>
+              <a:spcAft>
+                <a:spcPts val="0"/>
+              </a:spcAft>
+              <a:buNone/>
+            </a:pPr>
+            <a:r>
+              <a:t/>
+            </a:r>
+            <a:endParaRPr/>
+          </a:p>
+          <a:p>
+            <a:pPr indent="0" lvl="0" marL="0" rtl="0" algn="l">
+              <a:spcBef>
+                <a:spcPts val="0"/>
+              </a:spcBef>
+              <a:spcAft>
+                <a:spcPts val="0"/>
+              </a:spcAft>
+              <a:buNone/>
+            </a:pPr>
+            <a:r>
+              <a:t/>
+            </a:r>
+            <a:endParaRPr/>
+          </a:p>
+          <a:p>
+            <a:pPr indent="0" lvl="0" marL="0" rtl="0" algn="l">
+              <a:spcBef>
+                <a:spcPts val="0"/>
+              </a:spcBef>
+              <a:spcAft>
+                <a:spcPts val="0"/>
+              </a:spcAft>
+              <a:buNone/>
+            </a:pPr>
+            <a:r>
+              <a:t/>
+            </a:r>
+            <a:endParaRPr/>
+          </a:p>
+        </p:txBody>
+      </p:sp>
+      <p:cxnSp>
+        <p:nvCxnSpPr>
+          <p:cNvPr id="180" name="Google Shape;180;p27"/>
+          <p:cNvCxnSpPr/>
+          <p:nvPr/>
+        </p:nvCxnSpPr>
+        <p:spPr>
+          <a:xfrm>
+            <a:off x="5249800" y="998200"/>
+            <a:ext cx="12300" cy="3167100"/>
+          </a:xfrm>
+          <a:prstGeom prst="straightConnector1">
+            <a:avLst/>
+          </a:prstGeom>
+          <a:noFill/>
+          <a:ln cap="flat" cmpd="sng" w="9525">
+            <a:solidFill>
+              <a:schemeClr val="dk2"/>
+            </a:solidFill>
+            <a:prstDash val="solid"/>
+            <a:round/>
+            <a:headEnd len="med" w="med" type="none"/>
+            <a:tailEnd len="med" w="med" type="none"/>
+          </a:ln>
+        </p:spPr>
+      </p:cxnSp>
+      <p:sp>
+        <p:nvSpPr>
+          <p:cNvPr id="181" name="Google Shape;181;p27"/>
+          <p:cNvSpPr txBox="1"/>
+          <p:nvPr/>
+        </p:nvSpPr>
+        <p:spPr>
+          <a:xfrm>
+            <a:off x="5253050" y="842500"/>
+            <a:ext cx="3942900" cy="3632700"/>
+          </a:xfrm>
+          <a:prstGeom prst="rect">
+            <a:avLst/>
+          </a:prstGeom>
+          <a:noFill/>
+          <a:ln>
+            <a:noFill/>
+          </a:ln>
+          <a:effectLst>
+            <a:outerShdw blurRad="57150" rotWithShape="0" algn="bl" dir="5400000" dist="19050">
+              <a:srgbClr val="000000">
+                <a:alpha val="50000"/>
+              </a:srgbClr>
+            </a:outerShdw>
+            <a:reflection blurRad="0" dir="5400000" dist="38100" endA="0" fadeDir="5400012" kx="0" rotWithShape="0" algn="bl" stPos="0" sy="-100000" ky="0"/>
+          </a:effectLst>
+        </p:spPr>
+        <p:txBody>
+          <a:bodyPr anchorCtr="0" anchor="t" bIns="91425" lIns="91425" spcFirstLastPara="1" rIns="91425" wrap="square" tIns="91425">
+            <a:spAutoFit/>
+          </a:bodyPr>
+          <a:lstStyle/>
+          <a:p>
+            <a:pPr indent="0" lvl="0" marL="0" rtl="0" algn="l">
+              <a:spcBef>
+                <a:spcPts val="0"/>
+              </a:spcBef>
+              <a:spcAft>
+                <a:spcPts val="0"/>
+              </a:spcAft>
+              <a:buNone/>
+            </a:pPr>
+            <a:r>
+              <a:rPr b="1" lang="es">
+                <a:solidFill>
+                  <a:srgbClr val="0000FF"/>
+                </a:solidFill>
+              </a:rPr>
+              <a:t>Balanceados</a:t>
+            </a:r>
+            <a:endParaRPr b="1">
+              <a:solidFill>
+                <a:srgbClr val="0000FF"/>
+              </a:solidFill>
+            </a:endParaRPr>
+          </a:p>
+          <a:p>
+            <a:pPr indent="0" lvl="0" marL="0" rtl="0" algn="l">
+              <a:spcBef>
+                <a:spcPts val="0"/>
+              </a:spcBef>
+              <a:spcAft>
+                <a:spcPts val="0"/>
+              </a:spcAft>
+              <a:buNone/>
+            </a:pPr>
+            <a:r>
+              <a:t/>
+            </a:r>
+            <a:endParaRPr/>
+          </a:p>
+          <a:p>
+            <a:pPr indent="0" lvl="0" marL="0" rtl="0" algn="l">
+              <a:spcBef>
+                <a:spcPts val="0"/>
+              </a:spcBef>
+              <a:spcAft>
+                <a:spcPts val="0"/>
+              </a:spcAft>
+              <a:buNone/>
+            </a:pPr>
+            <a:r>
+              <a:t/>
+            </a:r>
+            <a:endParaRPr/>
+          </a:p>
+          <a:p>
+            <a:pPr indent="0" lvl="0" marL="0" rtl="0" algn="l">
+              <a:spcBef>
+                <a:spcPts val="0"/>
+              </a:spcBef>
+              <a:spcAft>
+                <a:spcPts val="0"/>
+              </a:spcAft>
+              <a:buNone/>
+            </a:pPr>
+            <a:r>
+              <a:t/>
+            </a:r>
+            <a:endParaRPr/>
+          </a:p>
+          <a:p>
+            <a:pPr indent="0" lvl="0" marL="0" rtl="0" algn="l">
+              <a:spcBef>
+                <a:spcPts val="0"/>
+              </a:spcBef>
+              <a:spcAft>
+                <a:spcPts val="0"/>
+              </a:spcAft>
+              <a:buNone/>
+            </a:pPr>
+            <a:r>
+              <a:t/>
+            </a:r>
+            <a:endParaRPr/>
+          </a:p>
+          <a:p>
+            <a:pPr indent="0" lvl="0" marL="0" rtl="0" algn="l">
+              <a:spcBef>
+                <a:spcPts val="0"/>
+              </a:spcBef>
+              <a:spcAft>
+                <a:spcPts val="0"/>
+              </a:spcAft>
+              <a:buNone/>
+            </a:pPr>
+            <a:r>
+              <a:t/>
+            </a:r>
+            <a:endParaRPr/>
+          </a:p>
+          <a:p>
+            <a:pPr indent="0" lvl="0" marL="0" rtl="0" algn="l">
+              <a:spcBef>
+                <a:spcPts val="0"/>
+              </a:spcBef>
+              <a:spcAft>
+                <a:spcPts val="0"/>
+              </a:spcAft>
+              <a:buNone/>
+            </a:pPr>
+            <a:r>
+              <a:t/>
+            </a:r>
+            <a:endParaRPr/>
+          </a:p>
+          <a:p>
+            <a:pPr indent="0" lvl="0" marL="0" rtl="0" algn="l">
+              <a:spcBef>
+                <a:spcPts val="0"/>
+              </a:spcBef>
+              <a:spcAft>
+                <a:spcPts val="0"/>
+              </a:spcAft>
+              <a:buNone/>
+            </a:pPr>
+            <a:r>
+              <a:t/>
+            </a:r>
+            <a:endParaRPr/>
+          </a:p>
+          <a:p>
+            <a:pPr indent="0" lvl="0" marL="0" rtl="0" algn="l">
+              <a:spcBef>
+                <a:spcPts val="0"/>
+              </a:spcBef>
+              <a:spcAft>
+                <a:spcPts val="0"/>
+              </a:spcAft>
+              <a:buNone/>
+            </a:pPr>
+            <a:r>
+              <a:t/>
+            </a:r>
+            <a:endParaRPr/>
+          </a:p>
+          <a:p>
+            <a:pPr indent="0" lvl="0" marL="0" rtl="0" algn="l">
+              <a:spcBef>
+                <a:spcPts val="0"/>
+              </a:spcBef>
+              <a:spcAft>
+                <a:spcPts val="0"/>
+              </a:spcAft>
+              <a:buNone/>
+            </a:pPr>
+            <a:r>
+              <a:t/>
+            </a:r>
+            <a:endParaRPr/>
+          </a:p>
+          <a:p>
+            <a:pPr indent="0" lvl="0" marL="0" rtl="0" algn="l">
+              <a:spcBef>
+                <a:spcPts val="0"/>
+              </a:spcBef>
+              <a:spcAft>
+                <a:spcPts val="0"/>
+              </a:spcAft>
+              <a:buNone/>
+            </a:pPr>
+            <a:r>
+              <a:t/>
+            </a:r>
+            <a:endParaRPr/>
+          </a:p>
+          <a:p>
+            <a:pPr indent="0" lvl="0" marL="0" rtl="0" algn="l">
+              <a:spcBef>
+                <a:spcPts val="0"/>
+              </a:spcBef>
+              <a:spcAft>
+                <a:spcPts val="0"/>
+              </a:spcAft>
+              <a:buNone/>
+            </a:pPr>
+            <a:r>
+              <a:t/>
+            </a:r>
+            <a:endParaRPr/>
+          </a:p>
+          <a:p>
+            <a:pPr indent="0" lvl="0" marL="0" rtl="0" algn="l">
+              <a:spcBef>
+                <a:spcPts val="0"/>
+              </a:spcBef>
+              <a:spcAft>
+                <a:spcPts val="0"/>
+              </a:spcAft>
+              <a:buNone/>
+            </a:pPr>
+            <a:r>
+              <a:t/>
+            </a:r>
+            <a:endParaRPr/>
+          </a:p>
+          <a:p>
+            <a:pPr indent="0" lvl="0" marL="0" rtl="0" algn="l">
+              <a:spcBef>
+                <a:spcPts val="0"/>
+              </a:spcBef>
+              <a:spcAft>
+                <a:spcPts val="0"/>
+              </a:spcAft>
+              <a:buNone/>
+            </a:pPr>
+            <a:r>
+              <a:t/>
+            </a:r>
+            <a:endParaRPr/>
+          </a:p>
+          <a:p>
+            <a:pPr indent="0" lvl="0" marL="0" rtl="0" algn="l">
+              <a:spcBef>
+                <a:spcPts val="0"/>
+              </a:spcBef>
+              <a:spcAft>
+                <a:spcPts val="0"/>
+              </a:spcAft>
+              <a:buNone/>
+            </a:pPr>
+            <a:r>
+              <a:t/>
+            </a:r>
+            <a:endParaRPr/>
+          </a:p>
+          <a:p>
+            <a:pPr indent="0" lvl="0" marL="0" rtl="0" algn="l">
+              <a:spcBef>
+                <a:spcPts val="0"/>
+              </a:spcBef>
+              <a:spcAft>
+                <a:spcPts val="0"/>
+              </a:spcAft>
+              <a:buNone/>
+            </a:pPr>
+            <a:r>
+              <a:t/>
+            </a:r>
+            <a:endParaRPr/>
+          </a:p>
+        </p:txBody>
+      </p:sp>
+    </p:spTree>
+  </p:cSld>
+  <p:clrMapOvr>
+    <a:masterClrMapping/>
+  </p:clrMapOvr>
+</p:sld>
+</file>
+
+<file path=ppt/slides/slide16.xml><?xml version="1.0" encoding="utf-8"?>
+<p:sld xmlns:a="http://schemas.openxmlformats.org/drawingml/2006/main" xmlns:r="http://schemas.openxmlformats.org/officeDocument/2006/relationships" xmlns:mc="http://schemas.openxmlformats.org/markup-compatibility/2006" xmlns:mv="urn:schemas-microsoft-com:mac:vml" xmlns:p="http://schemas.openxmlformats.org/presentationml/2006/main" xmlns:c="http://schemas.openxmlformats.org/drawingml/2006/chart" xmlns:dgm="http://schemas.openxmlformats.org/drawingml/2006/diagram" xmlns:o="urn:schemas-microsoft-com:office:office" xmlns:v="urn:schemas-microsoft-com:vml" xmlns:pvml="urn:schemas-microsoft-com:office:powerpoint" xmlns:com="http://schemas.openxmlformats.org/drawingml/2006/compatibility" xmlns:p14="http://schemas.microsoft.com/office/powerpoint/2010/main" xmlns:p15="http://schemas.microsoft.com/office/powerpoint/2012/main" xmlns:ahyp="http://schemas.microsoft.com/office/drawing/2018/hyperlinkcolor">
+  <p:cSld>
+    <p:spTree>
+      <p:nvGrpSpPr>
+        <p:cNvPr id="185" name="Shape 185"/>
         <p:cNvGrpSpPr/>
         <p:nvPr/>
       </p:nvGrpSpPr>
@@ -9396,7 +9686,7 @@
       </p:grpSpPr>
       <p:pic>
         <p:nvPicPr>
-          <p:cNvPr id="173" name="Google Shape;173;p27"/>
+          <p:cNvPr id="186" name="Google Shape;186;p28"/>
           <p:cNvPicPr preferRelativeResize="0"/>
           <p:nvPr/>
         </p:nvPicPr>
@@ -9424,35 +9714,33 @@
       </p:pic>
       <p:sp>
         <p:nvSpPr>
-          <p:cNvPr id="174" name="Google Shape;174;p27"/>
+          <p:cNvPr id="187" name="Google Shape;187;p28"/>
           <p:cNvSpPr txBox="1"/>
-          <p:nvPr/>
+          <p:nvPr>
+            <p:ph type="title"/>
+          </p:nvPr>
         </p:nvSpPr>
         <p:spPr>
           <a:xfrm>
-            <a:off x="0" y="94375"/>
-            <a:ext cx="2775900" cy="671100"/>
+            <a:off x="252875" y="499200"/>
+            <a:ext cx="1584000" cy="572700"/>
           </a:xfrm>
           <a:prstGeom prst="rect">
             <a:avLst/>
           </a:prstGeom>
-          <a:noFill/>
-          <a:ln>
-            <a:noFill/>
-          </a:ln>
         </p:spPr>
         <p:txBody>
-          <a:bodyPr anchorCtr="0" anchor="ctr" bIns="0" lIns="91425" spcFirstLastPara="1" rIns="91425" wrap="square" tIns="0">
-            <a:spAutoFit/>
+          <a:bodyPr anchorCtr="0" anchor="t" bIns="91425" lIns="91425" spcFirstLastPara="1" rIns="91425" wrap="square" tIns="91425">
+            <a:normAutofit fontScale="90000"/>
           </a:bodyPr>
           <a:lstStyle/>
           <a:p>
-            <a:pPr indent="0" lvl="0" marL="457200" rtl="0" algn="l">
+            <a:pPr indent="0" lvl="0" marL="0" rtl="0" algn="l">
               <a:lnSpc>
-                <a:spcPct val="105000"/>
+                <a:spcPct val="90000"/>
               </a:lnSpc>
               <a:spcBef>
-                <a:spcPts val="0"/>
+                <a:spcPts val="1000"/>
               </a:spcBef>
               <a:spcAft>
                 <a:spcPts val="0"/>
@@ -9461,109 +9749,27 @@
             </a:pPr>
             <a:r>
               <a:rPr b="1" lang="es" sz="1866">
-                <a:solidFill>
-                  <a:schemeClr val="dk1"/>
-                </a:solidFill>
                 <a:latin typeface="EB Garamond"/>
                 <a:ea typeface="EB Garamond"/>
                 <a:cs typeface="EB Garamond"/>
                 <a:sym typeface="EB Garamond"/>
               </a:rPr>
-              <a:t>Gaussian Mixture:</a:t>
-            </a:r>
-            <a:r>
-              <a:rPr lang="es">
-                <a:solidFill>
-                  <a:schemeClr val="dk1"/>
-                </a:solidFill>
-                <a:highlight>
-                  <a:schemeClr val="lt1"/>
-                </a:highlight>
-              </a:rPr>
-              <a:t> </a:t>
-            </a:r>
-            <a:endParaRPr>
-              <a:solidFill>
-                <a:schemeClr val="dk1"/>
-              </a:solidFill>
-              <a:highlight>
-                <a:schemeClr val="lt1"/>
-              </a:highlight>
-            </a:endParaRPr>
+              <a:t>Resultados</a:t>
+            </a:r>
+            <a:endParaRPr sz="2650"/>
           </a:p>
           <a:p>
-            <a:pPr indent="0" lvl="0" marL="457200" rtl="0" algn="l">
-              <a:lnSpc>
-                <a:spcPct val="105000"/>
-              </a:lnSpc>
-              <a:spcBef>
-                <a:spcPts val="1200"/>
-              </a:spcBef>
-              <a:spcAft>
-                <a:spcPts val="1200"/>
+            <a:pPr indent="0" lvl="0" marL="0" rtl="0" algn="l">
+              <a:spcBef>
+                <a:spcPts val="0"/>
+              </a:spcBef>
+              <a:spcAft>
+                <a:spcPts val="0"/>
               </a:spcAft>
               <a:buNone/>
             </a:pPr>
             <a:r>
               <a:t/>
-            </a:r>
-            <a:endParaRPr/>
-          </a:p>
-        </p:txBody>
-      </p:sp>
-      <p:sp>
-        <p:nvSpPr>
-          <p:cNvPr id="175" name="Google Shape;175;p27"/>
-          <p:cNvSpPr txBox="1"/>
-          <p:nvPr/>
-        </p:nvSpPr>
-        <p:spPr>
-          <a:xfrm>
-            <a:off x="146925" y="375550"/>
-            <a:ext cx="3290100" cy="1945200"/>
-          </a:xfrm>
-          <a:prstGeom prst="rect">
-            <a:avLst/>
-          </a:prstGeom>
-          <a:noFill/>
-          <a:ln>
-            <a:noFill/>
-          </a:ln>
-        </p:spPr>
-        <p:txBody>
-          <a:bodyPr anchorCtr="0" anchor="t" bIns="91425" lIns="91425" spcFirstLastPara="1" rIns="91425" wrap="square" tIns="91425">
-            <a:spAutoFit/>
-          </a:bodyPr>
-          <a:lstStyle/>
-          <a:p>
-            <a:pPr indent="-328083" lvl="0" marL="457200" rtl="0" algn="l">
-              <a:lnSpc>
-                <a:spcPct val="105000"/>
-              </a:lnSpc>
-              <a:spcBef>
-                <a:spcPts val="0"/>
-              </a:spcBef>
-              <a:spcAft>
-                <a:spcPts val="0"/>
-              </a:spcAft>
-              <a:buClr>
-                <a:schemeClr val="dk1"/>
-              </a:buClr>
-              <a:buSzPts val="1567"/>
-              <a:buFont typeface="EB Garamond"/>
-              <a:buChar char="●"/>
-            </a:pPr>
-            <a:r>
-              <a:rPr lang="es" sz="1566">
-                <a:solidFill>
-                  <a:schemeClr val="dk1"/>
-                </a:solidFill>
-                <a:latin typeface="EB Garamond"/>
-                <a:ea typeface="EB Garamond"/>
-                <a:cs typeface="EB Garamond"/>
-                <a:sym typeface="EB Garamond"/>
-              </a:rPr>
-              <a:t>Es un modelo probabilístico el cual puede entenderse como una generalización de Kmeans en la cual de asignar cada observación a un único cluster, se obtiene una distribución probabilidad de pertenencia a cada uno.</a:t>
             </a:r>
             <a:endParaRPr/>
           </a:p>
@@ -9571,7 +9777,7 @@
       </p:sp>
       <p:pic>
         <p:nvPicPr>
-          <p:cNvPr id="176" name="Google Shape;176;p27"/>
+          <p:cNvPr id="188" name="Google Shape;188;p28"/>
           <p:cNvPicPr preferRelativeResize="0"/>
           <p:nvPr/>
         </p:nvPicPr>
@@ -9585,8 +9791,8 @@
         </p:blipFill>
         <p:spPr>
           <a:xfrm>
-            <a:off x="3589425" y="152400"/>
-            <a:ext cx="5248275" cy="1866900"/>
+            <a:off x="0" y="2343049"/>
+            <a:ext cx="9033101" cy="3133177"/>
           </a:xfrm>
           <a:prstGeom prst="rect">
             <a:avLst/>
@@ -9599,7 +9805,7 @@
       </p:pic>
       <p:pic>
         <p:nvPicPr>
-          <p:cNvPr id="177" name="Google Shape;177;p27"/>
+          <p:cNvPr id="189" name="Google Shape;189;p28"/>
           <p:cNvPicPr preferRelativeResize="0"/>
           <p:nvPr/>
         </p:nvPicPr>
@@ -9613,584 +9819,8 @@
         </p:blipFill>
         <p:spPr>
           <a:xfrm>
-            <a:off x="146925" y="2324100"/>
-            <a:ext cx="3455484" cy="2819400"/>
-          </a:xfrm>
-          <a:prstGeom prst="rect">
-            <a:avLst/>
-          </a:prstGeom>
-          <a:noFill/>
-          <a:ln>
-            <a:noFill/>
-          </a:ln>
-        </p:spPr>
-      </p:pic>
-    </p:spTree>
-  </p:cSld>
-  <p:clrMapOvr>
-    <a:masterClrMapping/>
-  </p:clrMapOvr>
-</p:sld>
-</file>
-
-<file path=ppt/slides/slide16.xml><?xml version="1.0" encoding="utf-8"?>
-<p:sld xmlns:a="http://schemas.openxmlformats.org/drawingml/2006/main" xmlns:r="http://schemas.openxmlformats.org/officeDocument/2006/relationships" xmlns:mc="http://schemas.openxmlformats.org/markup-compatibility/2006" xmlns:mv="urn:schemas-microsoft-com:mac:vml" xmlns:p="http://schemas.openxmlformats.org/presentationml/2006/main" xmlns:c="http://schemas.openxmlformats.org/drawingml/2006/chart" xmlns:dgm="http://schemas.openxmlformats.org/drawingml/2006/diagram" xmlns:o="urn:schemas-microsoft-com:office:office" xmlns:v="urn:schemas-microsoft-com:vml" xmlns:pvml="urn:schemas-microsoft-com:office:powerpoint" xmlns:com="http://schemas.openxmlformats.org/drawingml/2006/compatibility" xmlns:p14="http://schemas.microsoft.com/office/powerpoint/2010/main" xmlns:p15="http://schemas.microsoft.com/office/powerpoint/2012/main" xmlns:ahyp="http://schemas.microsoft.com/office/drawing/2018/hyperlinkcolor">
-  <p:cSld>
-    <p:spTree>
-      <p:nvGrpSpPr>
-        <p:cNvPr id="181" name="Shape 181"/>
-        <p:cNvGrpSpPr/>
-        <p:nvPr/>
-      </p:nvGrpSpPr>
-      <p:grpSpPr>
-        <a:xfrm>
-          <a:off x="0" y="0"/>
-          <a:ext cx="0" cy="0"/>
-          <a:chOff x="0" y="0"/>
-          <a:chExt cx="0" cy="0"/>
-        </a:xfrm>
-      </p:grpSpPr>
-      <p:sp>
-        <p:nvSpPr>
-          <p:cNvPr id="182" name="Google Shape;182;p28"/>
-          <p:cNvSpPr txBox="1"/>
-          <p:nvPr>
-            <p:ph type="title"/>
-          </p:nvPr>
-        </p:nvSpPr>
-        <p:spPr>
-          <a:xfrm>
-            <a:off x="245750" y="445025"/>
-            <a:ext cx="8520600" cy="572700"/>
-          </a:xfrm>
-          <a:prstGeom prst="rect">
-            <a:avLst/>
-          </a:prstGeom>
-        </p:spPr>
-        <p:txBody>
-          <a:bodyPr anchorCtr="0" anchor="t" bIns="91425" lIns="91425" spcFirstLastPara="1" rIns="91425" wrap="square" tIns="91425">
-            <a:normAutofit fontScale="90000"/>
-          </a:bodyPr>
-          <a:lstStyle/>
-          <a:p>
-            <a:pPr indent="0" lvl="0" marL="0" rtl="0" algn="l">
-              <a:lnSpc>
-                <a:spcPct val="90000"/>
-              </a:lnSpc>
-              <a:spcBef>
-                <a:spcPts val="1000"/>
-              </a:spcBef>
-              <a:spcAft>
-                <a:spcPts val="0"/>
-              </a:spcAft>
-              <a:buNone/>
-            </a:pPr>
-            <a:r>
-              <a:rPr b="1" lang="es" sz="1866">
-                <a:latin typeface="EB Garamond"/>
-                <a:ea typeface="EB Garamond"/>
-                <a:cs typeface="EB Garamond"/>
-                <a:sym typeface="EB Garamond"/>
-              </a:rPr>
-              <a:t>Resultados</a:t>
-            </a:r>
-            <a:endParaRPr sz="2650"/>
-          </a:p>
-          <a:p>
-            <a:pPr indent="0" lvl="0" marL="0" rtl="0" algn="l">
-              <a:spcBef>
-                <a:spcPts val="0"/>
-              </a:spcBef>
-              <a:spcAft>
-                <a:spcPts val="0"/>
-              </a:spcAft>
-              <a:buNone/>
-            </a:pPr>
-            <a:r>
-              <a:t/>
-            </a:r>
-            <a:endParaRPr/>
-          </a:p>
-        </p:txBody>
-      </p:sp>
-      <p:pic>
-        <p:nvPicPr>
-          <p:cNvPr id="183" name="Google Shape;183;p28"/>
-          <p:cNvPicPr preferRelativeResize="0"/>
-          <p:nvPr/>
-        </p:nvPicPr>
-        <p:blipFill>
-          <a:blip r:embed="rId3">
-            <a:alphaModFix/>
-          </a:blip>
-          <a:stretch>
-            <a:fillRect/>
-          </a:stretch>
-        </p:blipFill>
-        <p:spPr>
-          <a:xfrm>
-            <a:off x="152400" y="1170125"/>
-            <a:ext cx="8839202" cy="3115529"/>
-          </a:xfrm>
-          <a:prstGeom prst="rect">
-            <a:avLst/>
-          </a:prstGeom>
-          <a:noFill/>
-          <a:ln>
-            <a:noFill/>
-          </a:ln>
-        </p:spPr>
-      </p:pic>
-    </p:spTree>
-  </p:cSld>
-  <p:clrMapOvr>
-    <a:masterClrMapping/>
-  </p:clrMapOvr>
-</p:sld>
-</file>
-
-<file path=ppt/slides/slide17.xml><?xml version="1.0" encoding="utf-8"?>
-<p:sld xmlns:a="http://schemas.openxmlformats.org/drawingml/2006/main" xmlns:r="http://schemas.openxmlformats.org/officeDocument/2006/relationships" xmlns:mc="http://schemas.openxmlformats.org/markup-compatibility/2006" xmlns:mv="urn:schemas-microsoft-com:mac:vml" xmlns:p="http://schemas.openxmlformats.org/presentationml/2006/main" xmlns:c="http://schemas.openxmlformats.org/drawingml/2006/chart" xmlns:dgm="http://schemas.openxmlformats.org/drawingml/2006/diagram" xmlns:o="urn:schemas-microsoft-com:office:office" xmlns:v="urn:schemas-microsoft-com:vml" xmlns:pvml="urn:schemas-microsoft-com:office:powerpoint" xmlns:com="http://schemas.openxmlformats.org/drawingml/2006/compatibility" xmlns:p14="http://schemas.microsoft.com/office/powerpoint/2010/main" xmlns:p15="http://schemas.microsoft.com/office/powerpoint/2012/main" xmlns:ahyp="http://schemas.microsoft.com/office/drawing/2018/hyperlinkcolor">
-  <p:cSld>
-    <p:spTree>
-      <p:nvGrpSpPr>
-        <p:cNvPr id="187" name="Shape 187"/>
-        <p:cNvGrpSpPr/>
-        <p:nvPr/>
-      </p:nvGrpSpPr>
-      <p:grpSpPr>
-        <a:xfrm>
-          <a:off x="0" y="0"/>
-          <a:ext cx="0" cy="0"/>
-          <a:chOff x="0" y="0"/>
-          <a:chExt cx="0" cy="0"/>
-        </a:xfrm>
-      </p:grpSpPr>
-      <p:pic>
-        <p:nvPicPr>
-          <p:cNvPr id="188" name="Google Shape;188;p29"/>
-          <p:cNvPicPr preferRelativeResize="0"/>
-          <p:nvPr/>
-        </p:nvPicPr>
-        <p:blipFill>
-          <a:blip r:embed="rId3">
-            <a:alphaModFix/>
-          </a:blip>
-          <a:stretch>
-            <a:fillRect/>
-          </a:stretch>
-        </p:blipFill>
-        <p:spPr>
-          <a:xfrm>
-            <a:off x="6349195" y="0"/>
-            <a:ext cx="2794810" cy="5143501"/>
-          </a:xfrm>
-          <a:prstGeom prst="rect">
-            <a:avLst/>
-          </a:prstGeom>
-          <a:noFill/>
-          <a:ln>
-            <a:noFill/>
-          </a:ln>
-        </p:spPr>
-      </p:pic>
-      <p:sp>
-        <p:nvSpPr>
-          <p:cNvPr id="189" name="Google Shape;189;p29"/>
-          <p:cNvSpPr txBox="1"/>
-          <p:nvPr>
-            <p:ph type="title"/>
-          </p:nvPr>
-        </p:nvSpPr>
-        <p:spPr>
-          <a:xfrm>
-            <a:off x="245750" y="445025"/>
-            <a:ext cx="1281000" cy="572700"/>
-          </a:xfrm>
-          <a:prstGeom prst="rect">
-            <a:avLst/>
-          </a:prstGeom>
-        </p:spPr>
-        <p:txBody>
-          <a:bodyPr anchorCtr="0" anchor="t" bIns="91425" lIns="91425" spcFirstLastPara="1" rIns="91425" wrap="square" tIns="91425">
-            <a:normAutofit fontScale="90000"/>
-          </a:bodyPr>
-          <a:lstStyle/>
-          <a:p>
-            <a:pPr indent="0" lvl="0" marL="0" rtl="0" algn="l">
-              <a:lnSpc>
-                <a:spcPct val="90000"/>
-              </a:lnSpc>
-              <a:spcBef>
-                <a:spcPts val="1000"/>
-              </a:spcBef>
-              <a:spcAft>
-                <a:spcPts val="0"/>
-              </a:spcAft>
-              <a:buNone/>
-            </a:pPr>
-            <a:r>
-              <a:rPr b="1" lang="es" sz="1866">
-                <a:latin typeface="EB Garamond"/>
-                <a:ea typeface="EB Garamond"/>
-                <a:cs typeface="EB Garamond"/>
-                <a:sym typeface="EB Garamond"/>
-              </a:rPr>
-              <a:t>Resultados</a:t>
-            </a:r>
-            <a:endParaRPr sz="2650"/>
-          </a:p>
-          <a:p>
-            <a:pPr indent="0" lvl="0" marL="0" rtl="0" algn="l">
-              <a:spcBef>
-                <a:spcPts val="0"/>
-              </a:spcBef>
-              <a:spcAft>
-                <a:spcPts val="0"/>
-              </a:spcAft>
-              <a:buNone/>
-            </a:pPr>
-            <a:r>
-              <a:t/>
-            </a:r>
-            <a:endParaRPr/>
-          </a:p>
-        </p:txBody>
-      </p:sp>
-      <p:pic>
-        <p:nvPicPr>
-          <p:cNvPr id="190" name="Google Shape;190;p29"/>
-          <p:cNvPicPr preferRelativeResize="0"/>
-          <p:nvPr/>
-        </p:nvPicPr>
-        <p:blipFill>
-          <a:blip r:embed="rId4">
-            <a:alphaModFix/>
-          </a:blip>
-          <a:stretch>
-            <a:fillRect/>
-          </a:stretch>
-        </p:blipFill>
-        <p:spPr>
-          <a:xfrm>
-            <a:off x="152400" y="1170125"/>
-            <a:ext cx="8296275" cy="3790950"/>
-          </a:xfrm>
-          <a:prstGeom prst="rect">
-            <a:avLst/>
-          </a:prstGeom>
-          <a:noFill/>
-          <a:ln>
-            <a:noFill/>
-          </a:ln>
-        </p:spPr>
-      </p:pic>
-    </p:spTree>
-  </p:cSld>
-  <p:clrMapOvr>
-    <a:masterClrMapping/>
-  </p:clrMapOvr>
-</p:sld>
-</file>
-
-<file path=ppt/slides/slide18.xml><?xml version="1.0" encoding="utf-8"?>
-<p:sld xmlns:a="http://schemas.openxmlformats.org/drawingml/2006/main" xmlns:r="http://schemas.openxmlformats.org/officeDocument/2006/relationships" xmlns:mc="http://schemas.openxmlformats.org/markup-compatibility/2006" xmlns:mv="urn:schemas-microsoft-com:mac:vml" xmlns:p="http://schemas.openxmlformats.org/presentationml/2006/main" xmlns:c="http://schemas.openxmlformats.org/drawingml/2006/chart" xmlns:dgm="http://schemas.openxmlformats.org/drawingml/2006/diagram" xmlns:o="urn:schemas-microsoft-com:office:office" xmlns:v="urn:schemas-microsoft-com:vml" xmlns:pvml="urn:schemas-microsoft-com:office:powerpoint" xmlns:com="http://schemas.openxmlformats.org/drawingml/2006/compatibility" xmlns:p14="http://schemas.microsoft.com/office/powerpoint/2010/main" xmlns:p15="http://schemas.microsoft.com/office/powerpoint/2012/main" xmlns:ahyp="http://schemas.microsoft.com/office/drawing/2018/hyperlinkcolor">
-  <p:cSld>
-    <p:spTree>
-      <p:nvGrpSpPr>
-        <p:cNvPr id="194" name="Shape 194"/>
-        <p:cNvGrpSpPr/>
-        <p:nvPr/>
-      </p:nvGrpSpPr>
-      <p:grpSpPr>
-        <a:xfrm>
-          <a:off x="0" y="0"/>
-          <a:ext cx="0" cy="0"/>
-          <a:chOff x="0" y="0"/>
-          <a:chExt cx="0" cy="0"/>
-        </a:xfrm>
-      </p:grpSpPr>
-      <p:pic>
-        <p:nvPicPr>
-          <p:cNvPr id="195" name="Google Shape;195;p30"/>
-          <p:cNvPicPr preferRelativeResize="0"/>
-          <p:nvPr/>
-        </p:nvPicPr>
-        <p:blipFill>
-          <a:blip r:embed="rId3">
-            <a:alphaModFix/>
-          </a:blip>
-          <a:stretch>
-            <a:fillRect/>
-          </a:stretch>
-        </p:blipFill>
-        <p:spPr>
-          <a:xfrm>
-            <a:off x="6349195" y="0"/>
-            <a:ext cx="2794810" cy="5143501"/>
-          </a:xfrm>
-          <a:prstGeom prst="rect">
-            <a:avLst/>
-          </a:prstGeom>
-          <a:noFill/>
-          <a:ln>
-            <a:noFill/>
-          </a:ln>
-        </p:spPr>
-      </p:pic>
-      <p:sp>
-        <p:nvSpPr>
-          <p:cNvPr id="196" name="Google Shape;196;p30"/>
-          <p:cNvSpPr txBox="1"/>
-          <p:nvPr>
-            <p:ph type="title"/>
-          </p:nvPr>
-        </p:nvSpPr>
-        <p:spPr>
-          <a:xfrm>
-            <a:off x="221275" y="436875"/>
-            <a:ext cx="1934100" cy="572700"/>
-          </a:xfrm>
-          <a:prstGeom prst="rect">
-            <a:avLst/>
-          </a:prstGeom>
-        </p:spPr>
-        <p:txBody>
-          <a:bodyPr anchorCtr="0" anchor="t" bIns="91425" lIns="91425" spcFirstLastPara="1" rIns="91425" wrap="square" tIns="91425">
-            <a:normAutofit fontScale="90000"/>
-          </a:bodyPr>
-          <a:lstStyle/>
-          <a:p>
-            <a:pPr indent="0" lvl="0" marL="0" rtl="0" algn="l">
-              <a:lnSpc>
-                <a:spcPct val="90000"/>
-              </a:lnSpc>
-              <a:spcBef>
-                <a:spcPts val="1000"/>
-              </a:spcBef>
-              <a:spcAft>
-                <a:spcPts val="0"/>
-              </a:spcAft>
-              <a:buNone/>
-            </a:pPr>
-            <a:r>
-              <a:rPr b="1" lang="es" sz="1866">
-                <a:latin typeface="EB Garamond"/>
-                <a:ea typeface="EB Garamond"/>
-                <a:cs typeface="EB Garamond"/>
-                <a:sym typeface="EB Garamond"/>
-              </a:rPr>
-              <a:t>Resultados</a:t>
-            </a:r>
-            <a:endParaRPr sz="2650"/>
-          </a:p>
-          <a:p>
-            <a:pPr indent="0" lvl="0" marL="0" rtl="0" algn="l">
-              <a:spcBef>
-                <a:spcPts val="0"/>
-              </a:spcBef>
-              <a:spcAft>
-                <a:spcPts val="0"/>
-              </a:spcAft>
-              <a:buNone/>
-            </a:pPr>
-            <a:r>
-              <a:t/>
-            </a:r>
-            <a:endParaRPr/>
-          </a:p>
-        </p:txBody>
-      </p:sp>
-      <p:pic>
-        <p:nvPicPr>
-          <p:cNvPr id="197" name="Google Shape;197;p30"/>
-          <p:cNvPicPr preferRelativeResize="0"/>
-          <p:nvPr/>
-        </p:nvPicPr>
-        <p:blipFill>
-          <a:blip r:embed="rId4">
-            <a:alphaModFix/>
-          </a:blip>
-          <a:stretch>
-            <a:fillRect/>
-          </a:stretch>
-        </p:blipFill>
-        <p:spPr>
-          <a:xfrm>
-            <a:off x="152400" y="1170125"/>
-            <a:ext cx="8296275" cy="3733800"/>
-          </a:xfrm>
-          <a:prstGeom prst="rect">
-            <a:avLst/>
-          </a:prstGeom>
-          <a:noFill/>
-          <a:ln>
-            <a:noFill/>
-          </a:ln>
-        </p:spPr>
-      </p:pic>
-    </p:spTree>
-  </p:cSld>
-  <p:clrMapOvr>
-    <a:masterClrMapping/>
-  </p:clrMapOvr>
-</p:sld>
-</file>
-
-<file path=ppt/slides/slide19.xml><?xml version="1.0" encoding="utf-8"?>
-<p:sld xmlns:a="http://schemas.openxmlformats.org/drawingml/2006/main" xmlns:r="http://schemas.openxmlformats.org/officeDocument/2006/relationships" xmlns:mc="http://schemas.openxmlformats.org/markup-compatibility/2006" xmlns:mv="urn:schemas-microsoft-com:mac:vml" xmlns:p="http://schemas.openxmlformats.org/presentationml/2006/main" xmlns:c="http://schemas.openxmlformats.org/drawingml/2006/chart" xmlns:dgm="http://schemas.openxmlformats.org/drawingml/2006/diagram" xmlns:o="urn:schemas-microsoft-com:office:office" xmlns:v="urn:schemas-microsoft-com:vml" xmlns:pvml="urn:schemas-microsoft-com:office:powerpoint" xmlns:com="http://schemas.openxmlformats.org/drawingml/2006/compatibility" xmlns:p14="http://schemas.microsoft.com/office/powerpoint/2010/main" xmlns:p15="http://schemas.microsoft.com/office/powerpoint/2012/main" xmlns:ahyp="http://schemas.microsoft.com/office/drawing/2018/hyperlinkcolor">
-  <p:cSld>
-    <p:spTree>
-      <p:nvGrpSpPr>
-        <p:cNvPr id="201" name="Shape 201"/>
-        <p:cNvGrpSpPr/>
-        <p:nvPr/>
-      </p:nvGrpSpPr>
-      <p:grpSpPr>
-        <a:xfrm>
-          <a:off x="0" y="0"/>
-          <a:ext cx="0" cy="0"/>
-          <a:chOff x="0" y="0"/>
-          <a:chExt cx="0" cy="0"/>
-        </a:xfrm>
-      </p:grpSpPr>
-      <p:pic>
-        <p:nvPicPr>
-          <p:cNvPr id="202" name="Google Shape;202;p31"/>
-          <p:cNvPicPr preferRelativeResize="0"/>
-          <p:nvPr/>
-        </p:nvPicPr>
-        <p:blipFill>
-          <a:blip r:embed="rId3">
-            <a:alphaModFix/>
-          </a:blip>
-          <a:stretch>
-            <a:fillRect/>
-          </a:stretch>
-        </p:blipFill>
-        <p:spPr>
-          <a:xfrm>
-            <a:off x="6349195" y="0"/>
-            <a:ext cx="2794810" cy="5143501"/>
-          </a:xfrm>
-          <a:prstGeom prst="rect">
-            <a:avLst/>
-          </a:prstGeom>
-          <a:noFill/>
-          <a:ln>
-            <a:noFill/>
-          </a:ln>
-        </p:spPr>
-      </p:pic>
-      <p:sp>
-        <p:nvSpPr>
-          <p:cNvPr id="203" name="Google Shape;203;p31"/>
-          <p:cNvSpPr txBox="1"/>
-          <p:nvPr>
-            <p:ph type="title"/>
-          </p:nvPr>
-        </p:nvSpPr>
-        <p:spPr>
-          <a:xfrm>
-            <a:off x="252875" y="499200"/>
-            <a:ext cx="1584000" cy="572700"/>
-          </a:xfrm>
-          <a:prstGeom prst="rect">
-            <a:avLst/>
-          </a:prstGeom>
-        </p:spPr>
-        <p:txBody>
-          <a:bodyPr anchorCtr="0" anchor="t" bIns="91425" lIns="91425" spcFirstLastPara="1" rIns="91425" wrap="square" tIns="91425">
-            <a:normAutofit fontScale="90000"/>
-          </a:bodyPr>
-          <a:lstStyle/>
-          <a:p>
-            <a:pPr indent="0" lvl="0" marL="0" rtl="0" algn="l">
-              <a:lnSpc>
-                <a:spcPct val="90000"/>
-              </a:lnSpc>
-              <a:spcBef>
-                <a:spcPts val="1000"/>
-              </a:spcBef>
-              <a:spcAft>
-                <a:spcPts val="0"/>
-              </a:spcAft>
-              <a:buNone/>
-            </a:pPr>
-            <a:r>
-              <a:rPr b="1" lang="es" sz="1866">
-                <a:latin typeface="EB Garamond"/>
-                <a:ea typeface="EB Garamond"/>
-                <a:cs typeface="EB Garamond"/>
-                <a:sym typeface="EB Garamond"/>
-              </a:rPr>
-              <a:t>Resultados</a:t>
-            </a:r>
-            <a:endParaRPr sz="2650"/>
-          </a:p>
-          <a:p>
-            <a:pPr indent="0" lvl="0" marL="0" rtl="0" algn="l">
-              <a:spcBef>
-                <a:spcPts val="0"/>
-              </a:spcBef>
-              <a:spcAft>
-                <a:spcPts val="0"/>
-              </a:spcAft>
-              <a:buNone/>
-            </a:pPr>
-            <a:r>
-              <a:t/>
-            </a:r>
-            <a:endParaRPr/>
-          </a:p>
-        </p:txBody>
-      </p:sp>
-      <p:pic>
-        <p:nvPicPr>
-          <p:cNvPr id="204" name="Google Shape;204;p31"/>
-          <p:cNvPicPr preferRelativeResize="0"/>
-          <p:nvPr/>
-        </p:nvPicPr>
-        <p:blipFill>
-          <a:blip r:embed="rId4">
-            <a:alphaModFix/>
-          </a:blip>
-          <a:stretch>
-            <a:fillRect/>
-          </a:stretch>
-        </p:blipFill>
-        <p:spPr>
-          <a:xfrm>
-            <a:off x="-3375" y="2010324"/>
-            <a:ext cx="9033101" cy="3133177"/>
-          </a:xfrm>
-          <a:prstGeom prst="rect">
-            <a:avLst/>
-          </a:prstGeom>
-          <a:noFill/>
-          <a:ln>
-            <a:noFill/>
-          </a:ln>
-        </p:spPr>
-      </p:pic>
-      <p:pic>
-        <p:nvPicPr>
-          <p:cNvPr id="205" name="Google Shape;205;p31"/>
-          <p:cNvPicPr preferRelativeResize="0"/>
-          <p:nvPr/>
-        </p:nvPicPr>
-        <p:blipFill>
-          <a:blip r:embed="rId5">
-            <a:alphaModFix/>
-          </a:blip>
-          <a:stretch>
-            <a:fillRect/>
-          </a:stretch>
-        </p:blipFill>
-        <p:spPr>
-          <a:xfrm>
-            <a:off x="3410175" y="383725"/>
-            <a:ext cx="2893075" cy="1626600"/>
+            <a:off x="2535225" y="304850"/>
+            <a:ext cx="3515600" cy="1976600"/>
           </a:xfrm>
           <a:prstGeom prst="rect">
             <a:avLst/>
@@ -10718,508 +10348,6 @@
           </a:ln>
         </p:spPr>
       </p:pic>
-    </p:spTree>
-  </p:cSld>
-  <p:clrMapOvr>
-    <a:masterClrMapping/>
-  </p:clrMapOvr>
-</p:sld>
-</file>
-
-<file path=ppt/slides/slide20.xml><?xml version="1.0" encoding="utf-8"?>
-<p:sld xmlns:a="http://schemas.openxmlformats.org/drawingml/2006/main" xmlns:r="http://schemas.openxmlformats.org/officeDocument/2006/relationships" xmlns:mc="http://schemas.openxmlformats.org/markup-compatibility/2006" xmlns:mv="urn:schemas-microsoft-com:mac:vml" xmlns:p="http://schemas.openxmlformats.org/presentationml/2006/main" xmlns:c="http://schemas.openxmlformats.org/drawingml/2006/chart" xmlns:dgm="http://schemas.openxmlformats.org/drawingml/2006/diagram" xmlns:o="urn:schemas-microsoft-com:office:office" xmlns:v="urn:schemas-microsoft-com:vml" xmlns:pvml="urn:schemas-microsoft-com:office:powerpoint" xmlns:com="http://schemas.openxmlformats.org/drawingml/2006/compatibility" xmlns:p14="http://schemas.microsoft.com/office/powerpoint/2010/main" xmlns:p15="http://schemas.microsoft.com/office/powerpoint/2012/main" xmlns:ahyp="http://schemas.microsoft.com/office/drawing/2018/hyperlinkcolor">
-  <p:cSld>
-    <p:spTree>
-      <p:nvGrpSpPr>
-        <p:cNvPr id="209" name="Shape 209"/>
-        <p:cNvGrpSpPr/>
-        <p:nvPr/>
-      </p:nvGrpSpPr>
-      <p:grpSpPr>
-        <a:xfrm>
-          <a:off x="0" y="0"/>
-          <a:ext cx="0" cy="0"/>
-          <a:chOff x="0" y="0"/>
-          <a:chExt cx="0" cy="0"/>
-        </a:xfrm>
-      </p:grpSpPr>
-      <p:sp>
-        <p:nvSpPr>
-          <p:cNvPr id="210" name="Google Shape;210;p32"/>
-          <p:cNvSpPr txBox="1"/>
-          <p:nvPr>
-            <p:ph type="title"/>
-          </p:nvPr>
-        </p:nvSpPr>
-        <p:spPr>
-          <a:xfrm>
-            <a:off x="245750" y="445025"/>
-            <a:ext cx="1607400" cy="572700"/>
-          </a:xfrm>
-          <a:prstGeom prst="rect">
-            <a:avLst/>
-          </a:prstGeom>
-        </p:spPr>
-        <p:txBody>
-          <a:bodyPr anchorCtr="0" anchor="t" bIns="91425" lIns="91425" spcFirstLastPara="1" rIns="91425" wrap="square" tIns="91425">
-            <a:normAutofit fontScale="90000"/>
-          </a:bodyPr>
-          <a:lstStyle/>
-          <a:p>
-            <a:pPr indent="0" lvl="0" marL="0" rtl="0" algn="l">
-              <a:lnSpc>
-                <a:spcPct val="90000"/>
-              </a:lnSpc>
-              <a:spcBef>
-                <a:spcPts val="1000"/>
-              </a:spcBef>
-              <a:spcAft>
-                <a:spcPts val="0"/>
-              </a:spcAft>
-              <a:buNone/>
-            </a:pPr>
-            <a:r>
-              <a:rPr b="1" lang="es" sz="1866">
-                <a:latin typeface="EB Garamond"/>
-                <a:ea typeface="EB Garamond"/>
-                <a:cs typeface="EB Garamond"/>
-                <a:sym typeface="EB Garamond"/>
-              </a:rPr>
-              <a:t>Resultados</a:t>
-            </a:r>
-            <a:endParaRPr sz="2650"/>
-          </a:p>
-          <a:p>
-            <a:pPr indent="0" lvl="0" marL="0" rtl="0" algn="l">
-              <a:spcBef>
-                <a:spcPts val="0"/>
-              </a:spcBef>
-              <a:spcAft>
-                <a:spcPts val="0"/>
-              </a:spcAft>
-              <a:buNone/>
-            </a:pPr>
-            <a:r>
-              <a:t/>
-            </a:r>
-            <a:endParaRPr/>
-          </a:p>
-        </p:txBody>
-      </p:sp>
-      <p:pic>
-        <p:nvPicPr>
-          <p:cNvPr id="211" name="Google Shape;211;p32"/>
-          <p:cNvPicPr preferRelativeResize="0"/>
-          <p:nvPr/>
-        </p:nvPicPr>
-        <p:blipFill>
-          <a:blip r:embed="rId3">
-            <a:alphaModFix/>
-          </a:blip>
-          <a:stretch>
-            <a:fillRect/>
-          </a:stretch>
-        </p:blipFill>
-        <p:spPr>
-          <a:xfrm>
-            <a:off x="56000" y="1330775"/>
-            <a:ext cx="4649175" cy="3640075"/>
-          </a:xfrm>
-          <a:prstGeom prst="rect">
-            <a:avLst/>
-          </a:prstGeom>
-          <a:noFill/>
-          <a:ln>
-            <a:noFill/>
-          </a:ln>
-        </p:spPr>
-      </p:pic>
-      <p:pic>
-        <p:nvPicPr>
-          <p:cNvPr id="212" name="Google Shape;212;p32"/>
-          <p:cNvPicPr preferRelativeResize="0"/>
-          <p:nvPr/>
-        </p:nvPicPr>
-        <p:blipFill>
-          <a:blip r:embed="rId4">
-            <a:alphaModFix/>
-          </a:blip>
-          <a:stretch>
-            <a:fillRect/>
-          </a:stretch>
-        </p:blipFill>
-        <p:spPr>
-          <a:xfrm>
-            <a:off x="6349195" y="0"/>
-            <a:ext cx="2794810" cy="5143501"/>
-          </a:xfrm>
-          <a:prstGeom prst="rect">
-            <a:avLst/>
-          </a:prstGeom>
-          <a:noFill/>
-          <a:ln>
-            <a:noFill/>
-          </a:ln>
-        </p:spPr>
-      </p:pic>
-    </p:spTree>
-  </p:cSld>
-  <p:clrMapOvr>
-    <a:masterClrMapping/>
-  </p:clrMapOvr>
-</p:sld>
-</file>
-
-<file path=ppt/slides/slide21.xml><?xml version="1.0" encoding="utf-8"?>
-<p:sld xmlns:a="http://schemas.openxmlformats.org/drawingml/2006/main" xmlns:r="http://schemas.openxmlformats.org/officeDocument/2006/relationships" xmlns:mc="http://schemas.openxmlformats.org/markup-compatibility/2006" xmlns:mv="urn:schemas-microsoft-com:mac:vml" xmlns:p="http://schemas.openxmlformats.org/presentationml/2006/main" xmlns:c="http://schemas.openxmlformats.org/drawingml/2006/chart" xmlns:dgm="http://schemas.openxmlformats.org/drawingml/2006/diagram" xmlns:o="urn:schemas-microsoft-com:office:office" xmlns:v="urn:schemas-microsoft-com:vml" xmlns:pvml="urn:schemas-microsoft-com:office:powerpoint" xmlns:com="http://schemas.openxmlformats.org/drawingml/2006/compatibility" xmlns:p14="http://schemas.microsoft.com/office/powerpoint/2010/main" xmlns:p15="http://schemas.microsoft.com/office/powerpoint/2012/main" xmlns:ahyp="http://schemas.microsoft.com/office/drawing/2018/hyperlinkcolor">
-  <p:cSld>
-    <p:spTree>
-      <p:nvGrpSpPr>
-        <p:cNvPr id="216" name="Shape 216"/>
-        <p:cNvGrpSpPr/>
-        <p:nvPr/>
-      </p:nvGrpSpPr>
-      <p:grpSpPr>
-        <a:xfrm>
-          <a:off x="0" y="0"/>
-          <a:ext cx="0" cy="0"/>
-          <a:chOff x="0" y="0"/>
-          <a:chExt cx="0" cy="0"/>
-        </a:xfrm>
-      </p:grpSpPr>
-      <p:pic>
-        <p:nvPicPr>
-          <p:cNvPr id="217" name="Google Shape;217;p33"/>
-          <p:cNvPicPr preferRelativeResize="0"/>
-          <p:nvPr/>
-        </p:nvPicPr>
-        <p:blipFill>
-          <a:blip r:embed="rId3">
-            <a:alphaModFix/>
-          </a:blip>
-          <a:stretch>
-            <a:fillRect/>
-          </a:stretch>
-        </p:blipFill>
-        <p:spPr>
-          <a:xfrm>
-            <a:off x="6349195" y="0"/>
-            <a:ext cx="2794810" cy="5143501"/>
-          </a:xfrm>
-          <a:prstGeom prst="rect">
-            <a:avLst/>
-          </a:prstGeom>
-          <a:noFill/>
-          <a:ln>
-            <a:noFill/>
-          </a:ln>
-        </p:spPr>
-      </p:pic>
-      <p:sp>
-        <p:nvSpPr>
-          <p:cNvPr id="218" name="Google Shape;218;p33"/>
-          <p:cNvSpPr txBox="1"/>
-          <p:nvPr>
-            <p:ph type="title"/>
-          </p:nvPr>
-        </p:nvSpPr>
-        <p:spPr>
-          <a:xfrm>
-            <a:off x="311700" y="445025"/>
-            <a:ext cx="8520600" cy="572700"/>
-          </a:xfrm>
-          <a:prstGeom prst="rect">
-            <a:avLst/>
-          </a:prstGeom>
-        </p:spPr>
-        <p:txBody>
-          <a:bodyPr anchorCtr="0" anchor="t" bIns="91425" lIns="91425" spcFirstLastPara="1" rIns="91425" wrap="square" tIns="91425">
-            <a:noAutofit/>
-          </a:bodyPr>
-          <a:lstStyle/>
-          <a:p>
-            <a:pPr indent="0" lvl="0" marL="0" rtl="0" algn="l">
-              <a:spcBef>
-                <a:spcPts val="0"/>
-              </a:spcBef>
-              <a:spcAft>
-                <a:spcPts val="0"/>
-              </a:spcAft>
-              <a:buNone/>
-            </a:pPr>
-            <a:r>
-              <a:rPr b="1" lang="es" sz="1866">
-                <a:latin typeface="EB Garamond"/>
-                <a:ea typeface="EB Garamond"/>
-                <a:cs typeface="EB Garamond"/>
-                <a:sym typeface="EB Garamond"/>
-              </a:rPr>
-              <a:t>Conclusiones :</a:t>
-            </a:r>
-            <a:endParaRPr sz="2400"/>
-          </a:p>
-          <a:p>
-            <a:pPr indent="0" lvl="0" marL="0" rtl="0" algn="l">
-              <a:spcBef>
-                <a:spcPts val="0"/>
-              </a:spcBef>
-              <a:spcAft>
-                <a:spcPts val="0"/>
-              </a:spcAft>
-              <a:buNone/>
-            </a:pPr>
-            <a:r>
-              <a:t/>
-            </a:r>
-            <a:endParaRPr sz="2400"/>
-          </a:p>
-        </p:txBody>
-      </p:sp>
-      <p:sp>
-        <p:nvSpPr>
-          <p:cNvPr id="219" name="Google Shape;219;p33"/>
-          <p:cNvSpPr txBox="1"/>
-          <p:nvPr>
-            <p:ph idx="1" type="body"/>
-          </p:nvPr>
-        </p:nvSpPr>
-        <p:spPr>
-          <a:xfrm>
-            <a:off x="311700" y="1298125"/>
-            <a:ext cx="6037500" cy="2890200"/>
-          </a:xfrm>
-          <a:prstGeom prst="rect">
-            <a:avLst/>
-          </a:prstGeom>
-        </p:spPr>
-        <p:txBody>
-          <a:bodyPr anchorCtr="0" anchor="t" bIns="91425" lIns="91425" spcFirstLastPara="1" rIns="91425" wrap="square" tIns="91425">
-            <a:normAutofit lnSpcReduction="10000"/>
-          </a:bodyPr>
-          <a:lstStyle/>
-          <a:p>
-            <a:pPr indent="0" lvl="0" marL="0" rtl="0" algn="l">
-              <a:spcBef>
-                <a:spcPts val="0"/>
-              </a:spcBef>
-              <a:spcAft>
-                <a:spcPts val="0"/>
-              </a:spcAft>
-              <a:buNone/>
-            </a:pPr>
-            <a:r>
-              <a:rPr lang="es" sz="1400">
-                <a:solidFill>
-                  <a:schemeClr val="dk1"/>
-                </a:solidFill>
-                <a:highlight>
-                  <a:srgbClr val="FFFFFF"/>
-                </a:highlight>
-              </a:rPr>
-              <a:t>Durante la realización de este proyecto , surgieron ciertos problemas técnicos tales como:</a:t>
-            </a:r>
-            <a:endParaRPr sz="1400">
-              <a:solidFill>
-                <a:schemeClr val="dk1"/>
-              </a:solidFill>
-              <a:highlight>
-                <a:srgbClr val="FFFFFF"/>
-              </a:highlight>
-            </a:endParaRPr>
-          </a:p>
-          <a:p>
-            <a:pPr indent="-317500" lvl="0" marL="457200" rtl="0" algn="l">
-              <a:spcBef>
-                <a:spcPts val="1200"/>
-              </a:spcBef>
-              <a:spcAft>
-                <a:spcPts val="0"/>
-              </a:spcAft>
-              <a:buClr>
-                <a:schemeClr val="dk1"/>
-              </a:buClr>
-              <a:buSzPts val="1400"/>
-              <a:buChar char="●"/>
-            </a:pPr>
-            <a:r>
-              <a:rPr lang="es" sz="1400">
-                <a:solidFill>
-                  <a:schemeClr val="dk1"/>
-                </a:solidFill>
-                <a:highlight>
-                  <a:srgbClr val="FFFFFF"/>
-                </a:highlight>
-              </a:rPr>
-              <a:t>El dataset desde el punto de vista de la curación de datos ya se encuentra curado y procesado.</a:t>
-            </a:r>
-            <a:endParaRPr sz="1400">
-              <a:solidFill>
-                <a:schemeClr val="dk1"/>
-              </a:solidFill>
-              <a:highlight>
-                <a:srgbClr val="FFFFFF"/>
-              </a:highlight>
-            </a:endParaRPr>
-          </a:p>
-          <a:p>
-            <a:pPr indent="-317500" lvl="0" marL="457200" rtl="0" algn="l">
-              <a:spcBef>
-                <a:spcPts val="0"/>
-              </a:spcBef>
-              <a:spcAft>
-                <a:spcPts val="0"/>
-              </a:spcAft>
-              <a:buClr>
-                <a:schemeClr val="dk1"/>
-              </a:buClr>
-              <a:buSzPts val="1400"/>
-              <a:buChar char="●"/>
-            </a:pPr>
-            <a:r>
-              <a:rPr lang="es" sz="1400">
-                <a:solidFill>
-                  <a:schemeClr val="dk1"/>
-                </a:solidFill>
-                <a:highlight>
-                  <a:srgbClr val="FFFFFF"/>
-                </a:highlight>
-              </a:rPr>
-              <a:t>Por la propia naturaleza del problema (pagos fraudulentos sobre pagos “reales”) es un dataset con muchas desviaciones, mostrando muchas diferencias en las distribuciones.</a:t>
-            </a:r>
-            <a:endParaRPr sz="1400">
-              <a:solidFill>
-                <a:schemeClr val="dk1"/>
-              </a:solidFill>
-              <a:highlight>
-                <a:srgbClr val="FFFFFF"/>
-              </a:highlight>
-            </a:endParaRPr>
-          </a:p>
-          <a:p>
-            <a:pPr indent="-317500" lvl="0" marL="457200" rtl="0" algn="l">
-              <a:spcBef>
-                <a:spcPts val="0"/>
-              </a:spcBef>
-              <a:spcAft>
-                <a:spcPts val="0"/>
-              </a:spcAft>
-              <a:buClr>
-                <a:schemeClr val="dk1"/>
-              </a:buClr>
-              <a:buSzPts val="1400"/>
-              <a:buChar char="●"/>
-            </a:pPr>
-            <a:r>
-              <a:rPr lang="es" sz="1400">
-                <a:solidFill>
-                  <a:schemeClr val="dk1"/>
-                </a:solidFill>
-                <a:highlight>
-                  <a:srgbClr val="FFFFFF"/>
-                </a:highlight>
-              </a:rPr>
-              <a:t>La mayor parte de las features del dataset poseen poco valor </a:t>
-            </a:r>
-            <a:r>
-              <a:rPr lang="es" sz="1400">
-                <a:solidFill>
-                  <a:schemeClr val="dk1"/>
-                </a:solidFill>
-                <a:highlight>
-                  <a:srgbClr val="FFFFFF"/>
-                </a:highlight>
-              </a:rPr>
-              <a:t>semántico</a:t>
-            </a:r>
-            <a:r>
-              <a:rPr lang="es" sz="1400">
-                <a:solidFill>
-                  <a:schemeClr val="dk1"/>
-                </a:solidFill>
-                <a:highlight>
-                  <a:srgbClr val="FFFFFF"/>
-                </a:highlight>
-              </a:rPr>
-              <a:t> y refieren solo a PCAs.</a:t>
-            </a:r>
-            <a:endParaRPr sz="1400">
-              <a:solidFill>
-                <a:schemeClr val="dk1"/>
-              </a:solidFill>
-              <a:highlight>
-                <a:srgbClr val="FFFFFF"/>
-              </a:highlight>
-            </a:endParaRPr>
-          </a:p>
-          <a:p>
-            <a:pPr indent="-317500" lvl="0" marL="457200" rtl="0" algn="l">
-              <a:spcBef>
-                <a:spcPts val="0"/>
-              </a:spcBef>
-              <a:spcAft>
-                <a:spcPts val="0"/>
-              </a:spcAft>
-              <a:buClr>
-                <a:schemeClr val="dk1"/>
-              </a:buClr>
-              <a:buSzPts val="1400"/>
-              <a:buChar char="●"/>
-            </a:pPr>
-            <a:r>
-              <a:rPr lang="es" sz="1400">
-                <a:solidFill>
-                  <a:schemeClr val="dk1"/>
-                </a:solidFill>
-                <a:highlight>
-                  <a:srgbClr val="FFFFFF"/>
-                </a:highlight>
-              </a:rPr>
-              <a:t>Obtener nuevas features a partir de la variable </a:t>
-            </a:r>
-            <a:r>
-              <a:rPr b="1" lang="es" sz="1400">
-                <a:solidFill>
-                  <a:schemeClr val="dk1"/>
-                </a:solidFill>
-                <a:highlight>
-                  <a:srgbClr val="FFFFFF"/>
-                </a:highlight>
-              </a:rPr>
-              <a:t>time</a:t>
-            </a:r>
-            <a:endParaRPr b="1" sz="1400">
-              <a:solidFill>
-                <a:schemeClr val="dk1"/>
-              </a:solidFill>
-              <a:highlight>
-                <a:srgbClr val="FFFFFF"/>
-              </a:highlight>
-            </a:endParaRPr>
-          </a:p>
-          <a:p>
-            <a:pPr indent="0" lvl="0" marL="0" rtl="0" algn="l">
-              <a:spcBef>
-                <a:spcPts val="700"/>
-              </a:spcBef>
-              <a:spcAft>
-                <a:spcPts val="1200"/>
-              </a:spcAft>
-              <a:buNone/>
-            </a:pPr>
-            <a:r>
-              <a:t/>
-            </a:r>
-            <a:endParaRPr sz="1050">
-              <a:solidFill>
-                <a:schemeClr val="dk1"/>
-              </a:solidFill>
-              <a:highlight>
-                <a:srgbClr val="FFFFFF"/>
-              </a:highlight>
-            </a:endParaRPr>
-          </a:p>
-        </p:txBody>
-      </p:sp>
     </p:spTree>
   </p:cSld>
   <p:clrMapOvr>
@@ -11839,8 +10967,8 @@
         </p:blipFill>
         <p:spPr>
           <a:xfrm>
-            <a:off x="55325" y="1117873"/>
-            <a:ext cx="3878125" cy="3918425"/>
+            <a:off x="55325" y="959275"/>
+            <a:ext cx="4035101" cy="4077025"/>
           </a:xfrm>
           <a:prstGeom prst="rect">
             <a:avLst/>
@@ -11860,7 +10988,7 @@
         <p:spPr>
           <a:xfrm>
             <a:off x="114300" y="257100"/>
-            <a:ext cx="2635500" cy="666900"/>
+            <a:ext cx="3577200" cy="425700"/>
           </a:xfrm>
           <a:prstGeom prst="rect">
             <a:avLst/>
@@ -11895,11 +11023,7 @@
                 <a:cs typeface="EB Garamond"/>
                 <a:sym typeface="EB Garamond"/>
               </a:rPr>
-              <a:t>Logistic Regression sin balancea</a:t>
-            </a:r>
-            <a:r>
-              <a:rPr lang="es" sz="1100"/>
-              <a:t>r</a:t>
+              <a:t>Logistic Regression sin Balancear</a:t>
             </a:r>
             <a:endParaRPr sz="1100"/>
           </a:p>
@@ -11921,8 +11045,8 @@
         </p:blipFill>
         <p:spPr>
           <a:xfrm>
-            <a:off x="4111424" y="2861099"/>
-            <a:ext cx="4910125" cy="1929950"/>
+            <a:off x="4144700" y="2969425"/>
+            <a:ext cx="5258486" cy="2066875"/>
           </a:xfrm>
           <a:prstGeom prst="rect">
             <a:avLst/>
@@ -11949,8 +11073,8 @@
         </p:blipFill>
         <p:spPr>
           <a:xfrm>
-            <a:off x="3933449" y="38024"/>
-            <a:ext cx="3329297" cy="2533725"/>
+            <a:off x="4686675" y="57575"/>
+            <a:ext cx="3826150" cy="2911850"/>
           </a:xfrm>
           <a:prstGeom prst="rect">
             <a:avLst/>
@@ -12002,8 +11126,8 @@
         </p:blipFill>
         <p:spPr>
           <a:xfrm>
-            <a:off x="152400" y="1014808"/>
-            <a:ext cx="4051600" cy="3757217"/>
+            <a:off x="0" y="999375"/>
+            <a:ext cx="4259475" cy="3950000"/>
           </a:xfrm>
           <a:prstGeom prst="rect">
             <a:avLst/>
@@ -12083,7 +11207,7 @@
         </p:blipFill>
         <p:spPr>
           <a:xfrm>
-            <a:off x="5045425" y="87000"/>
+            <a:off x="4793700" y="87000"/>
             <a:ext cx="3877250" cy="3199200"/>
           </a:xfrm>
           <a:prstGeom prst="rect">
@@ -12111,8 +11235,8 @@
         </p:blipFill>
         <p:spPr>
           <a:xfrm>
-            <a:off x="4871075" y="3395250"/>
-            <a:ext cx="4051601" cy="1300500"/>
+            <a:off x="4268075" y="3450675"/>
+            <a:ext cx="4928500" cy="1581975"/>
           </a:xfrm>
           <a:prstGeom prst="rect">
             <a:avLst/>
@@ -12176,9 +11300,63 @@
           </a:ln>
         </p:spPr>
       </p:pic>
+      <p:sp>
+        <p:nvSpPr>
+          <p:cNvPr id="96" name="Google Shape;96;p18"/>
+          <p:cNvSpPr txBox="1"/>
+          <p:nvPr/>
+        </p:nvSpPr>
+        <p:spPr>
+          <a:xfrm>
+            <a:off x="152400" y="261250"/>
+            <a:ext cx="2571900" cy="425700"/>
+          </a:xfrm>
+          <a:prstGeom prst="rect">
+            <a:avLst/>
+          </a:prstGeom>
+          <a:noFill/>
+          <a:ln>
+            <a:noFill/>
+          </a:ln>
+        </p:spPr>
+        <p:txBody>
+          <a:bodyPr anchorCtr="0" anchor="t" bIns="91425" lIns="91425" spcFirstLastPara="1" rIns="91425" wrap="square" tIns="91425">
+            <a:spAutoFit/>
+          </a:bodyPr>
+          <a:lstStyle/>
+          <a:p>
+            <a:pPr indent="0" lvl="0" marL="0" rtl="0" algn="l">
+              <a:spcBef>
+                <a:spcPts val="0"/>
+              </a:spcBef>
+              <a:spcAft>
+                <a:spcPts val="0"/>
+              </a:spcAft>
+              <a:buNone/>
+            </a:pPr>
+            <a:r>
+              <a:rPr b="1" lang="es" sz="1566">
+                <a:solidFill>
+                  <a:schemeClr val="dk1"/>
+                </a:solidFill>
+                <a:latin typeface="EB Garamond"/>
+                <a:ea typeface="EB Garamond"/>
+                <a:cs typeface="EB Garamond"/>
+                <a:sym typeface="EB Garamond"/>
+              </a:rPr>
+              <a:t>XGBoost sin balancea</a:t>
+            </a:r>
+            <a:r>
+              <a:rPr lang="es"/>
+              <a:t>r</a:t>
+            </a:r>
+            <a:endParaRPr/>
+          </a:p>
+        </p:txBody>
+      </p:sp>
       <p:pic>
         <p:nvPicPr>
-          <p:cNvPr id="96" name="Google Shape;96;p18"/>
+          <p:cNvPr id="97" name="Google Shape;97;p18"/>
           <p:cNvPicPr preferRelativeResize="0"/>
           <p:nvPr/>
         </p:nvPicPr>
@@ -12192,8 +11370,8 @@
         </p:blipFill>
         <p:spPr>
           <a:xfrm>
-            <a:off x="152400" y="1750750"/>
-            <a:ext cx="3405199" cy="3240350"/>
+            <a:off x="4719200" y="338850"/>
+            <a:ext cx="4031129" cy="2975600"/>
           </a:xfrm>
           <a:prstGeom prst="rect">
             <a:avLst/>
@@ -12204,60 +11382,6 @@
           </a:ln>
         </p:spPr>
       </p:pic>
-      <p:sp>
-        <p:nvSpPr>
-          <p:cNvPr id="97" name="Google Shape;97;p18"/>
-          <p:cNvSpPr txBox="1"/>
-          <p:nvPr/>
-        </p:nvSpPr>
-        <p:spPr>
-          <a:xfrm>
-            <a:off x="152400" y="261250"/>
-            <a:ext cx="2571900" cy="425700"/>
-          </a:xfrm>
-          <a:prstGeom prst="rect">
-            <a:avLst/>
-          </a:prstGeom>
-          <a:noFill/>
-          <a:ln>
-            <a:noFill/>
-          </a:ln>
-        </p:spPr>
-        <p:txBody>
-          <a:bodyPr anchorCtr="0" anchor="t" bIns="91425" lIns="91425" spcFirstLastPara="1" rIns="91425" wrap="square" tIns="91425">
-            <a:spAutoFit/>
-          </a:bodyPr>
-          <a:lstStyle/>
-          <a:p>
-            <a:pPr indent="0" lvl="0" marL="0" rtl="0" algn="l">
-              <a:spcBef>
-                <a:spcPts val="0"/>
-              </a:spcBef>
-              <a:spcAft>
-                <a:spcPts val="0"/>
-              </a:spcAft>
-              <a:buNone/>
-            </a:pPr>
-            <a:r>
-              <a:rPr b="1" lang="es" sz="1566">
-                <a:solidFill>
-                  <a:schemeClr val="dk1"/>
-                </a:solidFill>
-                <a:latin typeface="EB Garamond"/>
-                <a:ea typeface="EB Garamond"/>
-                <a:cs typeface="EB Garamond"/>
-                <a:sym typeface="EB Garamond"/>
-              </a:rPr>
-              <a:t>XGBoost sin balancea</a:t>
-            </a:r>
-            <a:r>
-              <a:rPr lang="es"/>
-              <a:t>r</a:t>
-            </a:r>
-            <a:endParaRPr/>
-          </a:p>
-        </p:txBody>
-      </p:sp>
       <p:pic>
         <p:nvPicPr>
           <p:cNvPr id="98" name="Google Shape;98;p18"/>
@@ -12274,8 +11398,8 @@
         </p:blipFill>
         <p:spPr>
           <a:xfrm>
-            <a:off x="4020249" y="3061599"/>
-            <a:ext cx="4225349" cy="1663475"/>
+            <a:off x="207825" y="1119625"/>
+            <a:ext cx="3823850" cy="3638726"/>
           </a:xfrm>
           <a:prstGeom prst="rect">
             <a:avLst/>
@@ -12302,8 +11426,8 @@
         </p:blipFill>
         <p:spPr>
           <a:xfrm>
-            <a:off x="3905950" y="261250"/>
-            <a:ext cx="3237800" cy="2390000"/>
+            <a:off x="4031675" y="3296075"/>
+            <a:ext cx="5079825" cy="1999825"/>
           </a:xfrm>
           <a:prstGeom prst="rect">
             <a:avLst/>
@@ -12648,7 +11772,7 @@
         </p:blipFill>
         <p:spPr>
           <a:xfrm>
-            <a:off x="4253025" y="220700"/>
+            <a:off x="4696425" y="336125"/>
             <a:ext cx="3647675" cy="2930700"/>
           </a:xfrm>
           <a:prstGeom prst="rect">
@@ -12676,7 +11800,7 @@
         </p:blipFill>
         <p:spPr>
           <a:xfrm>
-            <a:off x="4253025" y="3355499"/>
+            <a:off x="3998075" y="3266824"/>
             <a:ext cx="4890975" cy="1669875"/>
           </a:xfrm>
           <a:prstGeom prst="rect">

</xml_diff>